<commit_message>
Little changes on the poster
</commit_message>
<xml_diff>
--- a/plakat.pptx
+++ b/plakat.pptx
@@ -1,19 +1,119 @@
 
 <file path=ppt/presentation.xml><?xml version="1.0" encoding="utf-8"?>
-<p:presentation xmlns:a="http://schemas.openxmlformats.org/drawingml/2006/main" xmlns:p="http://schemas.openxmlformats.org/presentationml/2006/main" xmlns:r="http://schemas.openxmlformats.org/officeDocument/2006/relationships" xmlns:p14="http://schemas.microsoft.com/office/powerpoint/2010/main" xmlns:p15="http://schemas.microsoft.com/office/powerpoint/2012/main" xmlns:mc="http://schemas.openxmlformats.org/markup-compatibility/2006">
+<p:presentation xmlns:a="http://schemas.openxmlformats.org/drawingml/2006/main" xmlns:r="http://schemas.openxmlformats.org/officeDocument/2006/relationships" xmlns:p="http://schemas.openxmlformats.org/presentationml/2006/main">
   <p:sldMasterIdLst>
-    <p:sldMasterId id="2147483648" r:id="rId2"/>
+    <p:sldMasterId id="2147483648" r:id="rId1"/>
   </p:sldMasterIdLst>
   <p:sldIdLst>
-    <p:sldId id="256" r:id="rId3"/>
+    <p:sldId id="256" r:id="rId2"/>
   </p:sldIdLst>
-  <p:sldSz cx="30275212" cy="42479912"/>
-  <p:notesSz cx="7559675" cy="10691812"/>
+  <p:sldSz cx="30275213" cy="42479913"/>
+  <p:notesSz cx="7559675" cy="10691813"/>
+  <p:defaultTextStyle>
+    <a:defPPr>
+      <a:defRPr lang="et-EE"/>
+    </a:defPPr>
+    <a:lvl1pPr marL="0" algn="l" defTabSz="914400" rtl="0" eaLnBrk="1" latinLnBrk="0" hangingPunct="1">
+      <a:defRPr sz="1800" kern="1200">
+        <a:solidFill>
+          <a:schemeClr val="tx1"/>
+        </a:solidFill>
+        <a:latin typeface="+mn-lt"/>
+        <a:ea typeface="+mn-ea"/>
+        <a:cs typeface="+mn-cs"/>
+      </a:defRPr>
+    </a:lvl1pPr>
+    <a:lvl2pPr marL="457200" algn="l" defTabSz="914400" rtl="0" eaLnBrk="1" latinLnBrk="0" hangingPunct="1">
+      <a:defRPr sz="1800" kern="1200">
+        <a:solidFill>
+          <a:schemeClr val="tx1"/>
+        </a:solidFill>
+        <a:latin typeface="+mn-lt"/>
+        <a:ea typeface="+mn-ea"/>
+        <a:cs typeface="+mn-cs"/>
+      </a:defRPr>
+    </a:lvl2pPr>
+    <a:lvl3pPr marL="914400" algn="l" defTabSz="914400" rtl="0" eaLnBrk="1" latinLnBrk="0" hangingPunct="1">
+      <a:defRPr sz="1800" kern="1200">
+        <a:solidFill>
+          <a:schemeClr val="tx1"/>
+        </a:solidFill>
+        <a:latin typeface="+mn-lt"/>
+        <a:ea typeface="+mn-ea"/>
+        <a:cs typeface="+mn-cs"/>
+      </a:defRPr>
+    </a:lvl3pPr>
+    <a:lvl4pPr marL="1371600" algn="l" defTabSz="914400" rtl="0" eaLnBrk="1" latinLnBrk="0" hangingPunct="1">
+      <a:defRPr sz="1800" kern="1200">
+        <a:solidFill>
+          <a:schemeClr val="tx1"/>
+        </a:solidFill>
+        <a:latin typeface="+mn-lt"/>
+        <a:ea typeface="+mn-ea"/>
+        <a:cs typeface="+mn-cs"/>
+      </a:defRPr>
+    </a:lvl4pPr>
+    <a:lvl5pPr marL="1828800" algn="l" defTabSz="914400" rtl="0" eaLnBrk="1" latinLnBrk="0" hangingPunct="1">
+      <a:defRPr sz="1800" kern="1200">
+        <a:solidFill>
+          <a:schemeClr val="tx1"/>
+        </a:solidFill>
+        <a:latin typeface="+mn-lt"/>
+        <a:ea typeface="+mn-ea"/>
+        <a:cs typeface="+mn-cs"/>
+      </a:defRPr>
+    </a:lvl5pPr>
+    <a:lvl6pPr marL="2286000" algn="l" defTabSz="914400" rtl="0" eaLnBrk="1" latinLnBrk="0" hangingPunct="1">
+      <a:defRPr sz="1800" kern="1200">
+        <a:solidFill>
+          <a:schemeClr val="tx1"/>
+        </a:solidFill>
+        <a:latin typeface="+mn-lt"/>
+        <a:ea typeface="+mn-ea"/>
+        <a:cs typeface="+mn-cs"/>
+      </a:defRPr>
+    </a:lvl6pPr>
+    <a:lvl7pPr marL="2743200" algn="l" defTabSz="914400" rtl="0" eaLnBrk="1" latinLnBrk="0" hangingPunct="1">
+      <a:defRPr sz="1800" kern="1200">
+        <a:solidFill>
+          <a:schemeClr val="tx1"/>
+        </a:solidFill>
+        <a:latin typeface="+mn-lt"/>
+        <a:ea typeface="+mn-ea"/>
+        <a:cs typeface="+mn-cs"/>
+      </a:defRPr>
+    </a:lvl7pPr>
+    <a:lvl8pPr marL="3200400" algn="l" defTabSz="914400" rtl="0" eaLnBrk="1" latinLnBrk="0" hangingPunct="1">
+      <a:defRPr sz="1800" kern="1200">
+        <a:solidFill>
+          <a:schemeClr val="tx1"/>
+        </a:solidFill>
+        <a:latin typeface="+mn-lt"/>
+        <a:ea typeface="+mn-ea"/>
+        <a:cs typeface="+mn-cs"/>
+      </a:defRPr>
+    </a:lvl8pPr>
+    <a:lvl9pPr marL="3657600" algn="l" defTabSz="914400" rtl="0" eaLnBrk="1" latinLnBrk="0" hangingPunct="1">
+      <a:defRPr sz="1800" kern="1200">
+        <a:solidFill>
+          <a:schemeClr val="tx1"/>
+        </a:solidFill>
+        <a:latin typeface="+mn-lt"/>
+        <a:ea typeface="+mn-ea"/>
+        <a:cs typeface="+mn-cs"/>
+      </a:defRPr>
+    </a:lvl9pPr>
+  </p:defaultTextStyle>
+  <p:extLst>
+    <p:ext uri="{EFAFB233-063F-42B5-8137-9DF3F51BA10A}">
+      <p15:sldGuideLst xmlns:p15="http://schemas.microsoft.com/office/powerpoint/2012/main"/>
+    </p:ext>
+  </p:extLst>
 </p:presentation>
 </file>
 
 <file path=ppt/slideLayouts/slideLayout1.xml><?xml version="1.0" encoding="utf-8"?>
-<p:sldLayout xmlns:a="http://schemas.openxmlformats.org/drawingml/2006/main" xmlns:p="http://schemas.openxmlformats.org/presentationml/2006/main" xmlns:r="http://schemas.openxmlformats.org/officeDocument/2006/relationships" xmlns:p14="http://schemas.microsoft.com/office/powerpoint/2010/main" xmlns:p15="http://schemas.microsoft.com/office/powerpoint/2012/main" xmlns:mc="http://schemas.openxmlformats.org/markup-compatibility/2006" type="blank" preserve="1">
+<p:sldLayout xmlns:a="http://schemas.openxmlformats.org/drawingml/2006/main" xmlns:r="http://schemas.openxmlformats.org/officeDocument/2006/relationships" xmlns:p="http://schemas.openxmlformats.org/presentationml/2006/main" type="blank" preserve="1">
   <p:cSld name="Blank Slide">
     <p:spTree>
       <p:nvGrpSpPr>
@@ -31,11 +131,14 @@
       </p:grpSpPr>
     </p:spTree>
   </p:cSld>
+  <p:clrMapOvr>
+    <a:masterClrMapping/>
+  </p:clrMapOvr>
 </p:sldLayout>
 </file>
 
 <file path=ppt/slideLayouts/slideLayout10.xml><?xml version="1.0" encoding="utf-8"?>
-<p:sldLayout xmlns:a="http://schemas.openxmlformats.org/drawingml/2006/main" xmlns:p="http://schemas.openxmlformats.org/presentationml/2006/main" xmlns:r="http://schemas.openxmlformats.org/officeDocument/2006/relationships" xmlns:p14="http://schemas.microsoft.com/office/powerpoint/2010/main" xmlns:p15="http://schemas.microsoft.com/office/powerpoint/2012/main" xmlns:mc="http://schemas.openxmlformats.org/markup-compatibility/2006" type="objOverTx" preserve="1">
+<p:sldLayout xmlns:a="http://schemas.openxmlformats.org/drawingml/2006/main" xmlns:r="http://schemas.openxmlformats.org/officeDocument/2006/relationships" xmlns:p="http://schemas.openxmlformats.org/presentationml/2006/main" type="objOverTx" preserve="1">
   <p:cSld name="Title, Content over Content">
     <p:spTree>
       <p:nvGrpSpPr>
@@ -71,15 +174,16 @@
           </a:prstGeom>
         </p:spPr>
         <p:txBody>
-          <a:bodyPr lIns="0" rIns="0" tIns="0" bIns="0" anchor="ctr"/>
-          <a:p>
-            <a:endParaRPr b="0" lang="et-EE" sz="6869" spc="-1" strike="noStrike">
-              <a:solidFill>
-                <a:srgbClr val="000000"/>
-              </a:solidFill>
-              <a:uFill>
-                <a:solidFill>
-                  <a:srgbClr val="ffffff"/>
+          <a:bodyPr lIns="0" tIns="0" rIns="0" bIns="0" anchor="ctr"/>
+          <a:lstStyle/>
+          <a:p>
+            <a:endParaRPr lang="et-EE" sz="6869" b="0" strike="noStrike" spc="-1">
+              <a:solidFill>
+                <a:srgbClr val="000000"/>
+              </a:solidFill>
+              <a:uFill>
+                <a:solidFill>
+                  <a:srgbClr val="FFFFFF"/>
                 </a:solidFill>
               </a:uFill>
               <a:latin typeface="Calibri"/>
@@ -107,15 +211,16 @@
           </a:prstGeom>
         </p:spPr>
         <p:txBody>
-          <a:bodyPr lIns="0" rIns="0" tIns="0" bIns="0"/>
-          <a:p>
-            <a:endParaRPr b="0" lang="et-EE" sz="9270" spc="-1" strike="noStrike">
-              <a:solidFill>
-                <a:srgbClr val="000000"/>
-              </a:solidFill>
-              <a:uFill>
-                <a:solidFill>
-                  <a:srgbClr val="ffffff"/>
+          <a:bodyPr lIns="0" tIns="0" rIns="0" bIns="0"/>
+          <a:lstStyle/>
+          <a:p>
+            <a:endParaRPr lang="et-EE" sz="9270" b="0" strike="noStrike" spc="-1">
+              <a:solidFill>
+                <a:srgbClr val="000000"/>
+              </a:solidFill>
+              <a:uFill>
+                <a:solidFill>
+                  <a:srgbClr val="FFFFFF"/>
                 </a:solidFill>
               </a:uFill>
               <a:latin typeface="Calibri"/>
@@ -143,15 +248,16 @@
           </a:prstGeom>
         </p:spPr>
         <p:txBody>
-          <a:bodyPr lIns="0" rIns="0" tIns="0" bIns="0"/>
-          <a:p>
-            <a:endParaRPr b="0" lang="et-EE" sz="9270" spc="-1" strike="noStrike">
-              <a:solidFill>
-                <a:srgbClr val="000000"/>
-              </a:solidFill>
-              <a:uFill>
-                <a:solidFill>
-                  <a:srgbClr val="ffffff"/>
+          <a:bodyPr lIns="0" tIns="0" rIns="0" bIns="0"/>
+          <a:lstStyle/>
+          <a:p>
+            <a:endParaRPr lang="et-EE" sz="9270" b="0" strike="noStrike" spc="-1">
+              <a:solidFill>
+                <a:srgbClr val="000000"/>
+              </a:solidFill>
+              <a:uFill>
+                <a:solidFill>
+                  <a:srgbClr val="FFFFFF"/>
                 </a:solidFill>
               </a:uFill>
               <a:latin typeface="Calibri"/>
@@ -161,11 +267,14 @@
       </p:sp>
     </p:spTree>
   </p:cSld>
+  <p:clrMapOvr>
+    <a:masterClrMapping/>
+  </p:clrMapOvr>
 </p:sldLayout>
 </file>
 
 <file path=ppt/slideLayouts/slideLayout11.xml><?xml version="1.0" encoding="utf-8"?>
-<p:sldLayout xmlns:a="http://schemas.openxmlformats.org/drawingml/2006/main" xmlns:p="http://schemas.openxmlformats.org/presentationml/2006/main" xmlns:r="http://schemas.openxmlformats.org/officeDocument/2006/relationships" xmlns:p14="http://schemas.microsoft.com/office/powerpoint/2010/main" xmlns:p15="http://schemas.microsoft.com/office/powerpoint/2012/main" xmlns:mc="http://schemas.openxmlformats.org/markup-compatibility/2006" type="fourObj" preserve="1">
+<p:sldLayout xmlns:a="http://schemas.openxmlformats.org/drawingml/2006/main" xmlns:r="http://schemas.openxmlformats.org/officeDocument/2006/relationships" xmlns:p="http://schemas.openxmlformats.org/presentationml/2006/main" type="fourObj" preserve="1">
   <p:cSld name="Title, 4 Content">
     <p:spTree>
       <p:nvGrpSpPr>
@@ -201,15 +310,16 @@
           </a:prstGeom>
         </p:spPr>
         <p:txBody>
-          <a:bodyPr lIns="0" rIns="0" tIns="0" bIns="0" anchor="ctr"/>
-          <a:p>
-            <a:endParaRPr b="0" lang="et-EE" sz="6869" spc="-1" strike="noStrike">
-              <a:solidFill>
-                <a:srgbClr val="000000"/>
-              </a:solidFill>
-              <a:uFill>
-                <a:solidFill>
-                  <a:srgbClr val="ffffff"/>
+          <a:bodyPr lIns="0" tIns="0" rIns="0" bIns="0" anchor="ctr"/>
+          <a:lstStyle/>
+          <a:p>
+            <a:endParaRPr lang="et-EE" sz="6869" b="0" strike="noStrike" spc="-1">
+              <a:solidFill>
+                <a:srgbClr val="000000"/>
+              </a:solidFill>
+              <a:uFill>
+                <a:solidFill>
+                  <a:srgbClr val="FFFFFF"/>
                 </a:solidFill>
               </a:uFill>
               <a:latin typeface="Calibri"/>
@@ -237,15 +347,16 @@
           </a:prstGeom>
         </p:spPr>
         <p:txBody>
-          <a:bodyPr lIns="0" rIns="0" tIns="0" bIns="0"/>
-          <a:p>
-            <a:endParaRPr b="0" lang="et-EE" sz="9270" spc="-1" strike="noStrike">
-              <a:solidFill>
-                <a:srgbClr val="000000"/>
-              </a:solidFill>
-              <a:uFill>
-                <a:solidFill>
-                  <a:srgbClr val="ffffff"/>
+          <a:bodyPr lIns="0" tIns="0" rIns="0" bIns="0"/>
+          <a:lstStyle/>
+          <a:p>
+            <a:endParaRPr lang="et-EE" sz="9270" b="0" strike="noStrike" spc="-1">
+              <a:solidFill>
+                <a:srgbClr val="000000"/>
+              </a:solidFill>
+              <a:uFill>
+                <a:solidFill>
+                  <a:srgbClr val="FFFFFF"/>
                 </a:solidFill>
               </a:uFill>
               <a:latin typeface="Calibri"/>
@@ -273,15 +384,16 @@
           </a:prstGeom>
         </p:spPr>
         <p:txBody>
-          <a:bodyPr lIns="0" rIns="0" tIns="0" bIns="0"/>
-          <a:p>
-            <a:endParaRPr b="0" lang="et-EE" sz="9270" spc="-1" strike="noStrike">
-              <a:solidFill>
-                <a:srgbClr val="000000"/>
-              </a:solidFill>
-              <a:uFill>
-                <a:solidFill>
-                  <a:srgbClr val="ffffff"/>
+          <a:bodyPr lIns="0" tIns="0" rIns="0" bIns="0"/>
+          <a:lstStyle/>
+          <a:p>
+            <a:endParaRPr lang="et-EE" sz="9270" b="0" strike="noStrike" spc="-1">
+              <a:solidFill>
+                <a:srgbClr val="000000"/>
+              </a:solidFill>
+              <a:uFill>
+                <a:solidFill>
+                  <a:srgbClr val="FFFFFF"/>
                 </a:solidFill>
               </a:uFill>
               <a:latin typeface="Calibri"/>
@@ -309,15 +421,16 @@
           </a:prstGeom>
         </p:spPr>
         <p:txBody>
-          <a:bodyPr lIns="0" rIns="0" tIns="0" bIns="0"/>
-          <a:p>
-            <a:endParaRPr b="0" lang="et-EE" sz="9270" spc="-1" strike="noStrike">
-              <a:solidFill>
-                <a:srgbClr val="000000"/>
-              </a:solidFill>
-              <a:uFill>
-                <a:solidFill>
-                  <a:srgbClr val="ffffff"/>
+          <a:bodyPr lIns="0" tIns="0" rIns="0" bIns="0"/>
+          <a:lstStyle/>
+          <a:p>
+            <a:endParaRPr lang="et-EE" sz="9270" b="0" strike="noStrike" spc="-1">
+              <a:solidFill>
+                <a:srgbClr val="000000"/>
+              </a:solidFill>
+              <a:uFill>
+                <a:solidFill>
+                  <a:srgbClr val="FFFFFF"/>
                 </a:solidFill>
               </a:uFill>
               <a:latin typeface="Calibri"/>
@@ -345,15 +458,16 @@
           </a:prstGeom>
         </p:spPr>
         <p:txBody>
-          <a:bodyPr lIns="0" rIns="0" tIns="0" bIns="0"/>
-          <a:p>
-            <a:endParaRPr b="0" lang="et-EE" sz="9270" spc="-1" strike="noStrike">
-              <a:solidFill>
-                <a:srgbClr val="000000"/>
-              </a:solidFill>
-              <a:uFill>
-                <a:solidFill>
-                  <a:srgbClr val="ffffff"/>
+          <a:bodyPr lIns="0" tIns="0" rIns="0" bIns="0"/>
+          <a:lstStyle/>
+          <a:p>
+            <a:endParaRPr lang="et-EE" sz="9270" b="0" strike="noStrike" spc="-1">
+              <a:solidFill>
+                <a:srgbClr val="000000"/>
+              </a:solidFill>
+              <a:uFill>
+                <a:solidFill>
+                  <a:srgbClr val="FFFFFF"/>
                 </a:solidFill>
               </a:uFill>
               <a:latin typeface="Calibri"/>
@@ -363,11 +477,14 @@
       </p:sp>
     </p:spTree>
   </p:cSld>
+  <p:clrMapOvr>
+    <a:masterClrMapping/>
+  </p:clrMapOvr>
 </p:sldLayout>
 </file>
 
 <file path=ppt/slideLayouts/slideLayout12.xml><?xml version="1.0" encoding="utf-8"?>
-<p:sldLayout xmlns:a="http://schemas.openxmlformats.org/drawingml/2006/main" xmlns:p="http://schemas.openxmlformats.org/presentationml/2006/main" xmlns:r="http://schemas.openxmlformats.org/officeDocument/2006/relationships" xmlns:p14="http://schemas.microsoft.com/office/powerpoint/2010/main" xmlns:p15="http://schemas.microsoft.com/office/powerpoint/2012/main" xmlns:mc="http://schemas.openxmlformats.org/markup-compatibility/2006" type="blank" preserve="1">
+<p:sldLayout xmlns:a="http://schemas.openxmlformats.org/drawingml/2006/main" xmlns:r="http://schemas.openxmlformats.org/officeDocument/2006/relationships" xmlns:p="http://schemas.openxmlformats.org/presentationml/2006/main" type="blank" preserve="1">
   <p:cSld name="Title, 6 Content">
     <p:spTree>
       <p:nvGrpSpPr>
@@ -403,15 +520,16 @@
           </a:prstGeom>
         </p:spPr>
         <p:txBody>
-          <a:bodyPr lIns="0" rIns="0" tIns="0" bIns="0" anchor="ctr"/>
-          <a:p>
-            <a:endParaRPr b="0" lang="et-EE" sz="6869" spc="-1" strike="noStrike">
-              <a:solidFill>
-                <a:srgbClr val="000000"/>
-              </a:solidFill>
-              <a:uFill>
-                <a:solidFill>
-                  <a:srgbClr val="ffffff"/>
+          <a:bodyPr lIns="0" tIns="0" rIns="0" bIns="0" anchor="ctr"/>
+          <a:lstStyle/>
+          <a:p>
+            <a:endParaRPr lang="et-EE" sz="6869" b="0" strike="noStrike" spc="-1">
+              <a:solidFill>
+                <a:srgbClr val="000000"/>
+              </a:solidFill>
+              <a:uFill>
+                <a:solidFill>
+                  <a:srgbClr val="FFFFFF"/>
                 </a:solidFill>
               </a:uFill>
               <a:latin typeface="Calibri"/>
@@ -439,15 +557,16 @@
           </a:prstGeom>
         </p:spPr>
         <p:txBody>
-          <a:bodyPr lIns="0" rIns="0" tIns="0" bIns="0"/>
-          <a:p>
-            <a:endParaRPr b="0" lang="et-EE" sz="9270" spc="-1" strike="noStrike">
-              <a:solidFill>
-                <a:srgbClr val="000000"/>
-              </a:solidFill>
-              <a:uFill>
-                <a:solidFill>
-                  <a:srgbClr val="ffffff"/>
+          <a:bodyPr lIns="0" tIns="0" rIns="0" bIns="0"/>
+          <a:lstStyle/>
+          <a:p>
+            <a:endParaRPr lang="et-EE" sz="9270" b="0" strike="noStrike" spc="-1">
+              <a:solidFill>
+                <a:srgbClr val="000000"/>
+              </a:solidFill>
+              <a:uFill>
+                <a:solidFill>
+                  <a:srgbClr val="FFFFFF"/>
                 </a:solidFill>
               </a:uFill>
               <a:latin typeface="Calibri"/>
@@ -475,15 +594,16 @@
           </a:prstGeom>
         </p:spPr>
         <p:txBody>
-          <a:bodyPr lIns="0" rIns="0" tIns="0" bIns="0"/>
-          <a:p>
-            <a:endParaRPr b="0" lang="et-EE" sz="9270" spc="-1" strike="noStrike">
-              <a:solidFill>
-                <a:srgbClr val="000000"/>
-              </a:solidFill>
-              <a:uFill>
-                <a:solidFill>
-                  <a:srgbClr val="ffffff"/>
+          <a:bodyPr lIns="0" tIns="0" rIns="0" bIns="0"/>
+          <a:lstStyle/>
+          <a:p>
+            <a:endParaRPr lang="et-EE" sz="9270" b="0" strike="noStrike" spc="-1">
+              <a:solidFill>
+                <a:srgbClr val="000000"/>
+              </a:solidFill>
+              <a:uFill>
+                <a:solidFill>
+                  <a:srgbClr val="FFFFFF"/>
                 </a:solidFill>
               </a:uFill>
               <a:latin typeface="Calibri"/>
@@ -511,15 +631,16 @@
           </a:prstGeom>
         </p:spPr>
         <p:txBody>
-          <a:bodyPr lIns="0" rIns="0" tIns="0" bIns="0"/>
-          <a:p>
-            <a:endParaRPr b="0" lang="et-EE" sz="9270" spc="-1" strike="noStrike">
-              <a:solidFill>
-                <a:srgbClr val="000000"/>
-              </a:solidFill>
-              <a:uFill>
-                <a:solidFill>
-                  <a:srgbClr val="ffffff"/>
+          <a:bodyPr lIns="0" tIns="0" rIns="0" bIns="0"/>
+          <a:lstStyle/>
+          <a:p>
+            <a:endParaRPr lang="et-EE" sz="9270" b="0" strike="noStrike" spc="-1">
+              <a:solidFill>
+                <a:srgbClr val="000000"/>
+              </a:solidFill>
+              <a:uFill>
+                <a:solidFill>
+                  <a:srgbClr val="FFFFFF"/>
                 </a:solidFill>
               </a:uFill>
               <a:latin typeface="Calibri"/>
@@ -547,15 +668,16 @@
           </a:prstGeom>
         </p:spPr>
         <p:txBody>
-          <a:bodyPr lIns="0" rIns="0" tIns="0" bIns="0"/>
-          <a:p>
-            <a:endParaRPr b="0" lang="et-EE" sz="9270" spc="-1" strike="noStrike">
-              <a:solidFill>
-                <a:srgbClr val="000000"/>
-              </a:solidFill>
-              <a:uFill>
-                <a:solidFill>
-                  <a:srgbClr val="ffffff"/>
+          <a:bodyPr lIns="0" tIns="0" rIns="0" bIns="0"/>
+          <a:lstStyle/>
+          <a:p>
+            <a:endParaRPr lang="et-EE" sz="9270" b="0" strike="noStrike" spc="-1">
+              <a:solidFill>
+                <a:srgbClr val="000000"/>
+              </a:solidFill>
+              <a:uFill>
+                <a:solidFill>
+                  <a:srgbClr val="FFFFFF"/>
                 </a:solidFill>
               </a:uFill>
               <a:latin typeface="Calibri"/>
@@ -583,15 +705,16 @@
           </a:prstGeom>
         </p:spPr>
         <p:txBody>
-          <a:bodyPr lIns="0" rIns="0" tIns="0" bIns="0"/>
-          <a:p>
-            <a:endParaRPr b="0" lang="et-EE" sz="9270" spc="-1" strike="noStrike">
-              <a:solidFill>
-                <a:srgbClr val="000000"/>
-              </a:solidFill>
-              <a:uFill>
-                <a:solidFill>
-                  <a:srgbClr val="ffffff"/>
+          <a:bodyPr lIns="0" tIns="0" rIns="0" bIns="0"/>
+          <a:lstStyle/>
+          <a:p>
+            <a:endParaRPr lang="et-EE" sz="9270" b="0" strike="noStrike" spc="-1">
+              <a:solidFill>
+                <a:srgbClr val="000000"/>
+              </a:solidFill>
+              <a:uFill>
+                <a:solidFill>
+                  <a:srgbClr val="FFFFFF"/>
                 </a:solidFill>
               </a:uFill>
               <a:latin typeface="Calibri"/>
@@ -619,15 +742,16 @@
           </a:prstGeom>
         </p:spPr>
         <p:txBody>
-          <a:bodyPr lIns="0" rIns="0" tIns="0" bIns="0"/>
-          <a:p>
-            <a:endParaRPr b="0" lang="et-EE" sz="9270" spc="-1" strike="noStrike">
-              <a:solidFill>
-                <a:srgbClr val="000000"/>
-              </a:solidFill>
-              <a:uFill>
-                <a:solidFill>
-                  <a:srgbClr val="ffffff"/>
+          <a:bodyPr lIns="0" tIns="0" rIns="0" bIns="0"/>
+          <a:lstStyle/>
+          <a:p>
+            <a:endParaRPr lang="et-EE" sz="9270" b="0" strike="noStrike" spc="-1">
+              <a:solidFill>
+                <a:srgbClr val="000000"/>
+              </a:solidFill>
+              <a:uFill>
+                <a:solidFill>
+                  <a:srgbClr val="FFFFFF"/>
                 </a:solidFill>
               </a:uFill>
               <a:latin typeface="Calibri"/>
@@ -637,11 +761,14 @@
       </p:sp>
     </p:spTree>
   </p:cSld>
+  <p:clrMapOvr>
+    <a:masterClrMapping/>
+  </p:clrMapOvr>
 </p:sldLayout>
 </file>
 
 <file path=ppt/slideLayouts/slideLayout2.xml><?xml version="1.0" encoding="utf-8"?>
-<p:sldLayout xmlns:a="http://schemas.openxmlformats.org/drawingml/2006/main" xmlns:p="http://schemas.openxmlformats.org/presentationml/2006/main" xmlns:r="http://schemas.openxmlformats.org/officeDocument/2006/relationships" xmlns:p14="http://schemas.microsoft.com/office/powerpoint/2010/main" xmlns:p15="http://schemas.microsoft.com/office/powerpoint/2012/main" xmlns:mc="http://schemas.openxmlformats.org/markup-compatibility/2006" type="tx" preserve="1">
+<p:sldLayout xmlns:a="http://schemas.openxmlformats.org/drawingml/2006/main" xmlns:r="http://schemas.openxmlformats.org/officeDocument/2006/relationships" xmlns:p="http://schemas.openxmlformats.org/presentationml/2006/main" type="tx" preserve="1">
   <p:cSld name="Title Slide">
     <p:spTree>
       <p:nvGrpSpPr>
@@ -677,15 +804,16 @@
           </a:prstGeom>
         </p:spPr>
         <p:txBody>
-          <a:bodyPr lIns="0" rIns="0" tIns="0" bIns="0" anchor="ctr"/>
-          <a:p>
-            <a:endParaRPr b="0" lang="et-EE" sz="6869" spc="-1" strike="noStrike">
-              <a:solidFill>
-                <a:srgbClr val="000000"/>
-              </a:solidFill>
-              <a:uFill>
-                <a:solidFill>
-                  <a:srgbClr val="ffffff"/>
+          <a:bodyPr lIns="0" tIns="0" rIns="0" bIns="0" anchor="ctr"/>
+          <a:lstStyle/>
+          <a:p>
+            <a:endParaRPr lang="et-EE" sz="6869" b="0" strike="noStrike" spc="-1">
+              <a:solidFill>
+                <a:srgbClr val="000000"/>
+              </a:solidFill>
+              <a:uFill>
+                <a:solidFill>
+                  <a:srgbClr val="FFFFFF"/>
                 </a:solidFill>
               </a:uFill>
               <a:latin typeface="Calibri"/>
@@ -713,16 +841,17 @@
           </a:prstGeom>
         </p:spPr>
         <p:txBody>
-          <a:bodyPr lIns="0" rIns="0" tIns="0" bIns="0" anchor="ctr"/>
+          <a:bodyPr lIns="0" tIns="0" rIns="0" bIns="0" anchor="ctr"/>
+          <a:lstStyle/>
           <a:p>
             <a:pPr algn="ctr"/>
-            <a:endParaRPr b="0" lang="en-GB" sz="3200" spc="-1" strike="noStrike">
-              <a:solidFill>
-                <a:srgbClr val="000000"/>
-              </a:solidFill>
-              <a:uFill>
-                <a:solidFill>
-                  <a:srgbClr val="ffffff"/>
+            <a:endParaRPr lang="en-GB" sz="3200" b="0" strike="noStrike" spc="-1">
+              <a:solidFill>
+                <a:srgbClr val="000000"/>
+              </a:solidFill>
+              <a:uFill>
+                <a:solidFill>
+                  <a:srgbClr val="FFFFFF"/>
                 </a:solidFill>
               </a:uFill>
               <a:latin typeface="Arial"/>
@@ -732,11 +861,14 @@
       </p:sp>
     </p:spTree>
   </p:cSld>
+  <p:clrMapOvr>
+    <a:masterClrMapping/>
+  </p:clrMapOvr>
 </p:sldLayout>
 </file>
 
 <file path=ppt/slideLayouts/slideLayout3.xml><?xml version="1.0" encoding="utf-8"?>
-<p:sldLayout xmlns:a="http://schemas.openxmlformats.org/drawingml/2006/main" xmlns:p="http://schemas.openxmlformats.org/presentationml/2006/main" xmlns:r="http://schemas.openxmlformats.org/officeDocument/2006/relationships" xmlns:p14="http://schemas.microsoft.com/office/powerpoint/2010/main" xmlns:p15="http://schemas.microsoft.com/office/powerpoint/2012/main" xmlns:mc="http://schemas.openxmlformats.org/markup-compatibility/2006" type="obj" preserve="1">
+<p:sldLayout xmlns:a="http://schemas.openxmlformats.org/drawingml/2006/main" xmlns:r="http://schemas.openxmlformats.org/officeDocument/2006/relationships" xmlns:p="http://schemas.openxmlformats.org/presentationml/2006/main" type="obj" preserve="1">
   <p:cSld name="Title, Content">
     <p:spTree>
       <p:nvGrpSpPr>
@@ -772,15 +904,16 @@
           </a:prstGeom>
         </p:spPr>
         <p:txBody>
-          <a:bodyPr lIns="0" rIns="0" tIns="0" bIns="0" anchor="ctr"/>
-          <a:p>
-            <a:endParaRPr b="0" lang="et-EE" sz="6869" spc="-1" strike="noStrike">
-              <a:solidFill>
-                <a:srgbClr val="000000"/>
-              </a:solidFill>
-              <a:uFill>
-                <a:solidFill>
-                  <a:srgbClr val="ffffff"/>
+          <a:bodyPr lIns="0" tIns="0" rIns="0" bIns="0" anchor="ctr"/>
+          <a:lstStyle/>
+          <a:p>
+            <a:endParaRPr lang="et-EE" sz="6869" b="0" strike="noStrike" spc="-1">
+              <a:solidFill>
+                <a:srgbClr val="000000"/>
+              </a:solidFill>
+              <a:uFill>
+                <a:solidFill>
+                  <a:srgbClr val="FFFFFF"/>
                 </a:solidFill>
               </a:uFill>
               <a:latin typeface="Calibri"/>
@@ -808,15 +941,16 @@
           </a:prstGeom>
         </p:spPr>
         <p:txBody>
-          <a:bodyPr lIns="0" rIns="0" tIns="0" bIns="0"/>
-          <a:p>
-            <a:endParaRPr b="0" lang="et-EE" sz="9270" spc="-1" strike="noStrike">
-              <a:solidFill>
-                <a:srgbClr val="000000"/>
-              </a:solidFill>
-              <a:uFill>
-                <a:solidFill>
-                  <a:srgbClr val="ffffff"/>
+          <a:bodyPr lIns="0" tIns="0" rIns="0" bIns="0"/>
+          <a:lstStyle/>
+          <a:p>
+            <a:endParaRPr lang="et-EE" sz="9270" b="0" strike="noStrike" spc="-1">
+              <a:solidFill>
+                <a:srgbClr val="000000"/>
+              </a:solidFill>
+              <a:uFill>
+                <a:solidFill>
+                  <a:srgbClr val="FFFFFF"/>
                 </a:solidFill>
               </a:uFill>
               <a:latin typeface="Calibri"/>
@@ -826,11 +960,14 @@
       </p:sp>
     </p:spTree>
   </p:cSld>
+  <p:clrMapOvr>
+    <a:masterClrMapping/>
+  </p:clrMapOvr>
 </p:sldLayout>
 </file>
 
 <file path=ppt/slideLayouts/slideLayout4.xml><?xml version="1.0" encoding="utf-8"?>
-<p:sldLayout xmlns:a="http://schemas.openxmlformats.org/drawingml/2006/main" xmlns:p="http://schemas.openxmlformats.org/presentationml/2006/main" xmlns:r="http://schemas.openxmlformats.org/officeDocument/2006/relationships" xmlns:p14="http://schemas.microsoft.com/office/powerpoint/2010/main" xmlns:p15="http://schemas.microsoft.com/office/powerpoint/2012/main" xmlns:mc="http://schemas.openxmlformats.org/markup-compatibility/2006" type="twoObj" preserve="1">
+<p:sldLayout xmlns:a="http://schemas.openxmlformats.org/drawingml/2006/main" xmlns:r="http://schemas.openxmlformats.org/officeDocument/2006/relationships" xmlns:p="http://schemas.openxmlformats.org/presentationml/2006/main" type="twoObj" preserve="1">
   <p:cSld name="Title, 2 Content">
     <p:spTree>
       <p:nvGrpSpPr>
@@ -866,15 +1003,16 @@
           </a:prstGeom>
         </p:spPr>
         <p:txBody>
-          <a:bodyPr lIns="0" rIns="0" tIns="0" bIns="0" anchor="ctr"/>
-          <a:p>
-            <a:endParaRPr b="0" lang="et-EE" sz="6869" spc="-1" strike="noStrike">
-              <a:solidFill>
-                <a:srgbClr val="000000"/>
-              </a:solidFill>
-              <a:uFill>
-                <a:solidFill>
-                  <a:srgbClr val="ffffff"/>
+          <a:bodyPr lIns="0" tIns="0" rIns="0" bIns="0" anchor="ctr"/>
+          <a:lstStyle/>
+          <a:p>
+            <a:endParaRPr lang="et-EE" sz="6869" b="0" strike="noStrike" spc="-1">
+              <a:solidFill>
+                <a:srgbClr val="000000"/>
+              </a:solidFill>
+              <a:uFill>
+                <a:solidFill>
+                  <a:srgbClr val="FFFFFF"/>
                 </a:solidFill>
               </a:uFill>
               <a:latin typeface="Calibri"/>
@@ -902,15 +1040,16 @@
           </a:prstGeom>
         </p:spPr>
         <p:txBody>
-          <a:bodyPr lIns="0" rIns="0" tIns="0" bIns="0"/>
-          <a:p>
-            <a:endParaRPr b="0" lang="et-EE" sz="9270" spc="-1" strike="noStrike">
-              <a:solidFill>
-                <a:srgbClr val="000000"/>
-              </a:solidFill>
-              <a:uFill>
-                <a:solidFill>
-                  <a:srgbClr val="ffffff"/>
+          <a:bodyPr lIns="0" tIns="0" rIns="0" bIns="0"/>
+          <a:lstStyle/>
+          <a:p>
+            <a:endParaRPr lang="et-EE" sz="9270" b="0" strike="noStrike" spc="-1">
+              <a:solidFill>
+                <a:srgbClr val="000000"/>
+              </a:solidFill>
+              <a:uFill>
+                <a:solidFill>
+                  <a:srgbClr val="FFFFFF"/>
                 </a:solidFill>
               </a:uFill>
               <a:latin typeface="Calibri"/>
@@ -938,15 +1077,16 @@
           </a:prstGeom>
         </p:spPr>
         <p:txBody>
-          <a:bodyPr lIns="0" rIns="0" tIns="0" bIns="0"/>
-          <a:p>
-            <a:endParaRPr b="0" lang="et-EE" sz="9270" spc="-1" strike="noStrike">
-              <a:solidFill>
-                <a:srgbClr val="000000"/>
-              </a:solidFill>
-              <a:uFill>
-                <a:solidFill>
-                  <a:srgbClr val="ffffff"/>
+          <a:bodyPr lIns="0" tIns="0" rIns="0" bIns="0"/>
+          <a:lstStyle/>
+          <a:p>
+            <a:endParaRPr lang="et-EE" sz="9270" b="0" strike="noStrike" spc="-1">
+              <a:solidFill>
+                <a:srgbClr val="000000"/>
+              </a:solidFill>
+              <a:uFill>
+                <a:solidFill>
+                  <a:srgbClr val="FFFFFF"/>
                 </a:solidFill>
               </a:uFill>
               <a:latin typeface="Calibri"/>
@@ -956,11 +1096,14 @@
       </p:sp>
     </p:spTree>
   </p:cSld>
+  <p:clrMapOvr>
+    <a:masterClrMapping/>
+  </p:clrMapOvr>
 </p:sldLayout>
 </file>
 
 <file path=ppt/slideLayouts/slideLayout5.xml><?xml version="1.0" encoding="utf-8"?>
-<p:sldLayout xmlns:a="http://schemas.openxmlformats.org/drawingml/2006/main" xmlns:p="http://schemas.openxmlformats.org/presentationml/2006/main" xmlns:r="http://schemas.openxmlformats.org/officeDocument/2006/relationships" xmlns:p14="http://schemas.microsoft.com/office/powerpoint/2010/main" xmlns:p15="http://schemas.microsoft.com/office/powerpoint/2012/main" xmlns:mc="http://schemas.openxmlformats.org/markup-compatibility/2006" type="titleOnly" preserve="1">
+<p:sldLayout xmlns:a="http://schemas.openxmlformats.org/drawingml/2006/main" xmlns:r="http://schemas.openxmlformats.org/officeDocument/2006/relationships" xmlns:p="http://schemas.openxmlformats.org/presentationml/2006/main" type="titleOnly" preserve="1">
   <p:cSld name="Title Only">
     <p:spTree>
       <p:nvGrpSpPr>
@@ -996,15 +1139,16 @@
           </a:prstGeom>
         </p:spPr>
         <p:txBody>
-          <a:bodyPr lIns="0" rIns="0" tIns="0" bIns="0" anchor="ctr"/>
-          <a:p>
-            <a:endParaRPr b="0" lang="et-EE" sz="6869" spc="-1" strike="noStrike">
-              <a:solidFill>
-                <a:srgbClr val="000000"/>
-              </a:solidFill>
-              <a:uFill>
-                <a:solidFill>
-                  <a:srgbClr val="ffffff"/>
+          <a:bodyPr lIns="0" tIns="0" rIns="0" bIns="0" anchor="ctr"/>
+          <a:lstStyle/>
+          <a:p>
+            <a:endParaRPr lang="et-EE" sz="6869" b="0" strike="noStrike" spc="-1">
+              <a:solidFill>
+                <a:srgbClr val="000000"/>
+              </a:solidFill>
+              <a:uFill>
+                <a:solidFill>
+                  <a:srgbClr val="FFFFFF"/>
                 </a:solidFill>
               </a:uFill>
               <a:latin typeface="Calibri"/>
@@ -1014,11 +1158,14 @@
       </p:sp>
     </p:spTree>
   </p:cSld>
+  <p:clrMapOvr>
+    <a:masterClrMapping/>
+  </p:clrMapOvr>
 </p:sldLayout>
 </file>
 
 <file path=ppt/slideLayouts/slideLayout6.xml><?xml version="1.0" encoding="utf-8"?>
-<p:sldLayout xmlns:a="http://schemas.openxmlformats.org/drawingml/2006/main" xmlns:p="http://schemas.openxmlformats.org/presentationml/2006/main" xmlns:r="http://schemas.openxmlformats.org/officeDocument/2006/relationships" xmlns:p14="http://schemas.microsoft.com/office/powerpoint/2010/main" xmlns:p15="http://schemas.microsoft.com/office/powerpoint/2012/main" xmlns:mc="http://schemas.openxmlformats.org/markup-compatibility/2006" type="objOnly" preserve="1">
+<p:sldLayout xmlns:a="http://schemas.openxmlformats.org/drawingml/2006/main" xmlns:r="http://schemas.openxmlformats.org/officeDocument/2006/relationships" xmlns:p="http://schemas.openxmlformats.org/presentationml/2006/main" type="objOnly" preserve="1">
   <p:cSld name="Centered Text">
     <p:spTree>
       <p:nvGrpSpPr>
@@ -1054,16 +1201,17 @@
           </a:prstGeom>
         </p:spPr>
         <p:txBody>
-          <a:bodyPr lIns="0" rIns="0" tIns="0" bIns="0" anchor="ctr"/>
+          <a:bodyPr lIns="0" tIns="0" rIns="0" bIns="0" anchor="ctr"/>
+          <a:lstStyle/>
           <a:p>
             <a:pPr algn="ctr"/>
-            <a:endParaRPr b="0" lang="en-GB" sz="3200" spc="-1" strike="noStrike">
-              <a:solidFill>
-                <a:srgbClr val="000000"/>
-              </a:solidFill>
-              <a:uFill>
-                <a:solidFill>
-                  <a:srgbClr val="ffffff"/>
+            <a:endParaRPr lang="en-GB" sz="3200" b="0" strike="noStrike" spc="-1">
+              <a:solidFill>
+                <a:srgbClr val="000000"/>
+              </a:solidFill>
+              <a:uFill>
+                <a:solidFill>
+                  <a:srgbClr val="FFFFFF"/>
                 </a:solidFill>
               </a:uFill>
               <a:latin typeface="Arial"/>
@@ -1073,11 +1221,14 @@
       </p:sp>
     </p:spTree>
   </p:cSld>
+  <p:clrMapOvr>
+    <a:masterClrMapping/>
+  </p:clrMapOvr>
 </p:sldLayout>
 </file>
 
 <file path=ppt/slideLayouts/slideLayout7.xml><?xml version="1.0" encoding="utf-8"?>
-<p:sldLayout xmlns:a="http://schemas.openxmlformats.org/drawingml/2006/main" xmlns:p="http://schemas.openxmlformats.org/presentationml/2006/main" xmlns:r="http://schemas.openxmlformats.org/officeDocument/2006/relationships" xmlns:p14="http://schemas.microsoft.com/office/powerpoint/2010/main" xmlns:p15="http://schemas.microsoft.com/office/powerpoint/2012/main" xmlns:mc="http://schemas.openxmlformats.org/markup-compatibility/2006" type="twoObjAndObj" preserve="1">
+<p:sldLayout xmlns:a="http://schemas.openxmlformats.org/drawingml/2006/main" xmlns:r="http://schemas.openxmlformats.org/officeDocument/2006/relationships" xmlns:p="http://schemas.openxmlformats.org/presentationml/2006/main" type="twoObjAndObj" preserve="1">
   <p:cSld name="Title, 2 Content and Content">
     <p:spTree>
       <p:nvGrpSpPr>
@@ -1113,15 +1264,16 @@
           </a:prstGeom>
         </p:spPr>
         <p:txBody>
-          <a:bodyPr lIns="0" rIns="0" tIns="0" bIns="0" anchor="ctr"/>
-          <a:p>
-            <a:endParaRPr b="0" lang="et-EE" sz="6869" spc="-1" strike="noStrike">
-              <a:solidFill>
-                <a:srgbClr val="000000"/>
-              </a:solidFill>
-              <a:uFill>
-                <a:solidFill>
-                  <a:srgbClr val="ffffff"/>
+          <a:bodyPr lIns="0" tIns="0" rIns="0" bIns="0" anchor="ctr"/>
+          <a:lstStyle/>
+          <a:p>
+            <a:endParaRPr lang="et-EE" sz="6869" b="0" strike="noStrike" spc="-1">
+              <a:solidFill>
+                <a:srgbClr val="000000"/>
+              </a:solidFill>
+              <a:uFill>
+                <a:solidFill>
+                  <a:srgbClr val="FFFFFF"/>
                 </a:solidFill>
               </a:uFill>
               <a:latin typeface="Calibri"/>
@@ -1149,15 +1301,16 @@
           </a:prstGeom>
         </p:spPr>
         <p:txBody>
-          <a:bodyPr lIns="0" rIns="0" tIns="0" bIns="0"/>
-          <a:p>
-            <a:endParaRPr b="0" lang="et-EE" sz="9270" spc="-1" strike="noStrike">
-              <a:solidFill>
-                <a:srgbClr val="000000"/>
-              </a:solidFill>
-              <a:uFill>
-                <a:solidFill>
-                  <a:srgbClr val="ffffff"/>
+          <a:bodyPr lIns="0" tIns="0" rIns="0" bIns="0"/>
+          <a:lstStyle/>
+          <a:p>
+            <a:endParaRPr lang="et-EE" sz="9270" b="0" strike="noStrike" spc="-1">
+              <a:solidFill>
+                <a:srgbClr val="000000"/>
+              </a:solidFill>
+              <a:uFill>
+                <a:solidFill>
+                  <a:srgbClr val="FFFFFF"/>
                 </a:solidFill>
               </a:uFill>
               <a:latin typeface="Calibri"/>
@@ -1185,15 +1338,16 @@
           </a:prstGeom>
         </p:spPr>
         <p:txBody>
-          <a:bodyPr lIns="0" rIns="0" tIns="0" bIns="0"/>
-          <a:p>
-            <a:endParaRPr b="0" lang="et-EE" sz="9270" spc="-1" strike="noStrike">
-              <a:solidFill>
-                <a:srgbClr val="000000"/>
-              </a:solidFill>
-              <a:uFill>
-                <a:solidFill>
-                  <a:srgbClr val="ffffff"/>
+          <a:bodyPr lIns="0" tIns="0" rIns="0" bIns="0"/>
+          <a:lstStyle/>
+          <a:p>
+            <a:endParaRPr lang="et-EE" sz="9270" b="0" strike="noStrike" spc="-1">
+              <a:solidFill>
+                <a:srgbClr val="000000"/>
+              </a:solidFill>
+              <a:uFill>
+                <a:solidFill>
+                  <a:srgbClr val="FFFFFF"/>
                 </a:solidFill>
               </a:uFill>
               <a:latin typeface="Calibri"/>
@@ -1221,15 +1375,16 @@
           </a:prstGeom>
         </p:spPr>
         <p:txBody>
-          <a:bodyPr lIns="0" rIns="0" tIns="0" bIns="0"/>
-          <a:p>
-            <a:endParaRPr b="0" lang="et-EE" sz="9270" spc="-1" strike="noStrike">
-              <a:solidFill>
-                <a:srgbClr val="000000"/>
-              </a:solidFill>
-              <a:uFill>
-                <a:solidFill>
-                  <a:srgbClr val="ffffff"/>
+          <a:bodyPr lIns="0" tIns="0" rIns="0" bIns="0"/>
+          <a:lstStyle/>
+          <a:p>
+            <a:endParaRPr lang="et-EE" sz="9270" b="0" strike="noStrike" spc="-1">
+              <a:solidFill>
+                <a:srgbClr val="000000"/>
+              </a:solidFill>
+              <a:uFill>
+                <a:solidFill>
+                  <a:srgbClr val="FFFFFF"/>
                 </a:solidFill>
               </a:uFill>
               <a:latin typeface="Calibri"/>
@@ -1239,11 +1394,14 @@
       </p:sp>
     </p:spTree>
   </p:cSld>
+  <p:clrMapOvr>
+    <a:masterClrMapping/>
+  </p:clrMapOvr>
 </p:sldLayout>
 </file>
 
 <file path=ppt/slideLayouts/slideLayout8.xml><?xml version="1.0" encoding="utf-8"?>
-<p:sldLayout xmlns:a="http://schemas.openxmlformats.org/drawingml/2006/main" xmlns:p="http://schemas.openxmlformats.org/presentationml/2006/main" xmlns:r="http://schemas.openxmlformats.org/officeDocument/2006/relationships" xmlns:p14="http://schemas.microsoft.com/office/powerpoint/2010/main" xmlns:p15="http://schemas.microsoft.com/office/powerpoint/2012/main" xmlns:mc="http://schemas.openxmlformats.org/markup-compatibility/2006" type="objAndTwoObj" preserve="1">
+<p:sldLayout xmlns:a="http://schemas.openxmlformats.org/drawingml/2006/main" xmlns:r="http://schemas.openxmlformats.org/officeDocument/2006/relationships" xmlns:p="http://schemas.openxmlformats.org/presentationml/2006/main" type="objAndTwoObj" preserve="1">
   <p:cSld name="Title Content and 2 Content">
     <p:spTree>
       <p:nvGrpSpPr>
@@ -1279,15 +1437,16 @@
           </a:prstGeom>
         </p:spPr>
         <p:txBody>
-          <a:bodyPr lIns="0" rIns="0" tIns="0" bIns="0" anchor="ctr"/>
-          <a:p>
-            <a:endParaRPr b="0" lang="et-EE" sz="6869" spc="-1" strike="noStrike">
-              <a:solidFill>
-                <a:srgbClr val="000000"/>
-              </a:solidFill>
-              <a:uFill>
-                <a:solidFill>
-                  <a:srgbClr val="ffffff"/>
+          <a:bodyPr lIns="0" tIns="0" rIns="0" bIns="0" anchor="ctr"/>
+          <a:lstStyle/>
+          <a:p>
+            <a:endParaRPr lang="et-EE" sz="6869" b="0" strike="noStrike" spc="-1">
+              <a:solidFill>
+                <a:srgbClr val="000000"/>
+              </a:solidFill>
+              <a:uFill>
+                <a:solidFill>
+                  <a:srgbClr val="FFFFFF"/>
                 </a:solidFill>
               </a:uFill>
               <a:latin typeface="Calibri"/>
@@ -1315,15 +1474,16 @@
           </a:prstGeom>
         </p:spPr>
         <p:txBody>
-          <a:bodyPr lIns="0" rIns="0" tIns="0" bIns="0"/>
-          <a:p>
-            <a:endParaRPr b="0" lang="et-EE" sz="9270" spc="-1" strike="noStrike">
-              <a:solidFill>
-                <a:srgbClr val="000000"/>
-              </a:solidFill>
-              <a:uFill>
-                <a:solidFill>
-                  <a:srgbClr val="ffffff"/>
+          <a:bodyPr lIns="0" tIns="0" rIns="0" bIns="0"/>
+          <a:lstStyle/>
+          <a:p>
+            <a:endParaRPr lang="et-EE" sz="9270" b="0" strike="noStrike" spc="-1">
+              <a:solidFill>
+                <a:srgbClr val="000000"/>
+              </a:solidFill>
+              <a:uFill>
+                <a:solidFill>
+                  <a:srgbClr val="FFFFFF"/>
                 </a:solidFill>
               </a:uFill>
               <a:latin typeface="Calibri"/>
@@ -1351,15 +1511,16 @@
           </a:prstGeom>
         </p:spPr>
         <p:txBody>
-          <a:bodyPr lIns="0" rIns="0" tIns="0" bIns="0"/>
-          <a:p>
-            <a:endParaRPr b="0" lang="et-EE" sz="9270" spc="-1" strike="noStrike">
-              <a:solidFill>
-                <a:srgbClr val="000000"/>
-              </a:solidFill>
-              <a:uFill>
-                <a:solidFill>
-                  <a:srgbClr val="ffffff"/>
+          <a:bodyPr lIns="0" tIns="0" rIns="0" bIns="0"/>
+          <a:lstStyle/>
+          <a:p>
+            <a:endParaRPr lang="et-EE" sz="9270" b="0" strike="noStrike" spc="-1">
+              <a:solidFill>
+                <a:srgbClr val="000000"/>
+              </a:solidFill>
+              <a:uFill>
+                <a:solidFill>
+                  <a:srgbClr val="FFFFFF"/>
                 </a:solidFill>
               </a:uFill>
               <a:latin typeface="Calibri"/>
@@ -1387,15 +1548,16 @@
           </a:prstGeom>
         </p:spPr>
         <p:txBody>
-          <a:bodyPr lIns="0" rIns="0" tIns="0" bIns="0"/>
-          <a:p>
-            <a:endParaRPr b="0" lang="et-EE" sz="9270" spc="-1" strike="noStrike">
-              <a:solidFill>
-                <a:srgbClr val="000000"/>
-              </a:solidFill>
-              <a:uFill>
-                <a:solidFill>
-                  <a:srgbClr val="ffffff"/>
+          <a:bodyPr lIns="0" tIns="0" rIns="0" bIns="0"/>
+          <a:lstStyle/>
+          <a:p>
+            <a:endParaRPr lang="et-EE" sz="9270" b="0" strike="noStrike" spc="-1">
+              <a:solidFill>
+                <a:srgbClr val="000000"/>
+              </a:solidFill>
+              <a:uFill>
+                <a:solidFill>
+                  <a:srgbClr val="FFFFFF"/>
                 </a:solidFill>
               </a:uFill>
               <a:latin typeface="Calibri"/>
@@ -1405,11 +1567,14 @@
       </p:sp>
     </p:spTree>
   </p:cSld>
+  <p:clrMapOvr>
+    <a:masterClrMapping/>
+  </p:clrMapOvr>
 </p:sldLayout>
 </file>
 
 <file path=ppt/slideLayouts/slideLayout9.xml><?xml version="1.0" encoding="utf-8"?>
-<p:sldLayout xmlns:a="http://schemas.openxmlformats.org/drawingml/2006/main" xmlns:p="http://schemas.openxmlformats.org/presentationml/2006/main" xmlns:r="http://schemas.openxmlformats.org/officeDocument/2006/relationships" xmlns:p14="http://schemas.microsoft.com/office/powerpoint/2010/main" xmlns:p15="http://schemas.microsoft.com/office/powerpoint/2012/main" xmlns:mc="http://schemas.openxmlformats.org/markup-compatibility/2006" type="twoObjOverTx" preserve="1">
+<p:sldLayout xmlns:a="http://schemas.openxmlformats.org/drawingml/2006/main" xmlns:r="http://schemas.openxmlformats.org/officeDocument/2006/relationships" xmlns:p="http://schemas.openxmlformats.org/presentationml/2006/main" type="twoObjOverTx" preserve="1">
   <p:cSld name="Title, 2 Content over Content">
     <p:spTree>
       <p:nvGrpSpPr>
@@ -1445,15 +1610,16 @@
           </a:prstGeom>
         </p:spPr>
         <p:txBody>
-          <a:bodyPr lIns="0" rIns="0" tIns="0" bIns="0" anchor="ctr"/>
-          <a:p>
-            <a:endParaRPr b="0" lang="et-EE" sz="6869" spc="-1" strike="noStrike">
-              <a:solidFill>
-                <a:srgbClr val="000000"/>
-              </a:solidFill>
-              <a:uFill>
-                <a:solidFill>
-                  <a:srgbClr val="ffffff"/>
+          <a:bodyPr lIns="0" tIns="0" rIns="0" bIns="0" anchor="ctr"/>
+          <a:lstStyle/>
+          <a:p>
+            <a:endParaRPr lang="et-EE" sz="6869" b="0" strike="noStrike" spc="-1">
+              <a:solidFill>
+                <a:srgbClr val="000000"/>
+              </a:solidFill>
+              <a:uFill>
+                <a:solidFill>
+                  <a:srgbClr val="FFFFFF"/>
                 </a:solidFill>
               </a:uFill>
               <a:latin typeface="Calibri"/>
@@ -1481,15 +1647,16 @@
           </a:prstGeom>
         </p:spPr>
         <p:txBody>
-          <a:bodyPr lIns="0" rIns="0" tIns="0" bIns="0"/>
-          <a:p>
-            <a:endParaRPr b="0" lang="et-EE" sz="9270" spc="-1" strike="noStrike">
-              <a:solidFill>
-                <a:srgbClr val="000000"/>
-              </a:solidFill>
-              <a:uFill>
-                <a:solidFill>
-                  <a:srgbClr val="ffffff"/>
+          <a:bodyPr lIns="0" tIns="0" rIns="0" bIns="0"/>
+          <a:lstStyle/>
+          <a:p>
+            <a:endParaRPr lang="et-EE" sz="9270" b="0" strike="noStrike" spc="-1">
+              <a:solidFill>
+                <a:srgbClr val="000000"/>
+              </a:solidFill>
+              <a:uFill>
+                <a:solidFill>
+                  <a:srgbClr val="FFFFFF"/>
                 </a:solidFill>
               </a:uFill>
               <a:latin typeface="Calibri"/>
@@ -1517,15 +1684,16 @@
           </a:prstGeom>
         </p:spPr>
         <p:txBody>
-          <a:bodyPr lIns="0" rIns="0" tIns="0" bIns="0"/>
-          <a:p>
-            <a:endParaRPr b="0" lang="et-EE" sz="9270" spc="-1" strike="noStrike">
-              <a:solidFill>
-                <a:srgbClr val="000000"/>
-              </a:solidFill>
-              <a:uFill>
-                <a:solidFill>
-                  <a:srgbClr val="ffffff"/>
+          <a:bodyPr lIns="0" tIns="0" rIns="0" bIns="0"/>
+          <a:lstStyle/>
+          <a:p>
+            <a:endParaRPr lang="et-EE" sz="9270" b="0" strike="noStrike" spc="-1">
+              <a:solidFill>
+                <a:srgbClr val="000000"/>
+              </a:solidFill>
+              <a:uFill>
+                <a:solidFill>
+                  <a:srgbClr val="FFFFFF"/>
                 </a:solidFill>
               </a:uFill>
               <a:latin typeface="Calibri"/>
@@ -1553,15 +1721,16 @@
           </a:prstGeom>
         </p:spPr>
         <p:txBody>
-          <a:bodyPr lIns="0" rIns="0" tIns="0" bIns="0"/>
-          <a:p>
-            <a:endParaRPr b="0" lang="et-EE" sz="9270" spc="-1" strike="noStrike">
-              <a:solidFill>
-                <a:srgbClr val="000000"/>
-              </a:solidFill>
-              <a:uFill>
-                <a:solidFill>
-                  <a:srgbClr val="ffffff"/>
+          <a:bodyPr lIns="0" tIns="0" rIns="0" bIns="0"/>
+          <a:lstStyle/>
+          <a:p>
+            <a:endParaRPr lang="et-EE" sz="9270" b="0" strike="noStrike" spc="-1">
+              <a:solidFill>
+                <a:srgbClr val="000000"/>
+              </a:solidFill>
+              <a:uFill>
+                <a:solidFill>
+                  <a:srgbClr val="FFFFFF"/>
                 </a:solidFill>
               </a:uFill>
               <a:latin typeface="Calibri"/>
@@ -1571,17 +1740,21 @@
       </p:sp>
     </p:spTree>
   </p:cSld>
+  <p:clrMapOvr>
+    <a:masterClrMapping/>
+  </p:clrMapOvr>
 </p:sldLayout>
 </file>
 
 <file path=ppt/slideMasters/slideMaster1.xml><?xml version="1.0" encoding="utf-8"?>
-<p:sldMaster xmlns:a="http://schemas.openxmlformats.org/drawingml/2006/main" xmlns:p="http://schemas.openxmlformats.org/presentationml/2006/main" xmlns:r="http://schemas.openxmlformats.org/officeDocument/2006/relationships" xmlns:p14="http://schemas.microsoft.com/office/powerpoint/2010/main" xmlns:p15="http://schemas.microsoft.com/office/powerpoint/2012/main" xmlns:mc="http://schemas.openxmlformats.org/markup-compatibility/2006">
+<p:sldMaster xmlns:a="http://schemas.openxmlformats.org/drawingml/2006/main" xmlns:r="http://schemas.openxmlformats.org/officeDocument/2006/relationships" xmlns:p="http://schemas.openxmlformats.org/presentationml/2006/main">
   <p:cSld>
     <p:bg>
       <p:bgPr>
         <a:solidFill>
-          <a:srgbClr val="ffffff"/>
+          <a:srgbClr val="FFFFFF"/>
         </a:solidFill>
+        <a:effectLst/>
       </p:bgPr>
     </p:bg>
     <p:spTree>
@@ -1600,7 +1773,7 @@
       </p:grpSpPr>
       <p:sp>
         <p:nvSpPr>
-          <p:cNvPr id="0" name="PlaceHolder 1"/>
+          <p:cNvPr id="5" name="PlaceHolder 1"/>
           <p:cNvSpPr>
             <a:spLocks noGrp="1"/>
           </p:cNvSpPr>
@@ -1619,6 +1792,7 @@
         </p:spPr>
         <p:txBody>
           <a:bodyPr anchor="b"/>
+          <a:lstStyle/>
           <a:p>
             <a:pPr algn="ctr">
               <a:lnSpc>
@@ -1626,36 +1800,36 @@
               </a:lnSpc>
             </a:pPr>
             <a:r>
-              <a:rPr b="0" lang="et-EE" sz="19870" spc="-1" strike="noStrike">
+              <a:rPr lang="et-EE" sz="19870" b="0" strike="noStrike" spc="-1">
                 <a:solidFill>
                   <a:srgbClr val="000000"/>
                 </a:solidFill>
                 <a:uFill>
                   <a:solidFill>
-                    <a:srgbClr val="ffffff"/>
+                    <a:srgbClr val="FFFFFF"/>
                   </a:solidFill>
                 </a:uFill>
                 <a:latin typeface="Calibri Light"/>
               </a:rPr>
               <a:t>Muutke pealkirja laadi</a:t>
             </a:r>
-            <a:endParaRPr b="0" lang="et-EE" sz="19870" spc="-1" strike="noStrike">
-              <a:solidFill>
-                <a:srgbClr val="000000"/>
-              </a:solidFill>
-              <a:uFill>
-                <a:solidFill>
-                  <a:srgbClr val="ffffff"/>
-                </a:solidFill>
-              </a:uFill>
-              <a:latin typeface="Calibri"/>
-            </a:endParaRPr>
-          </a:p>
-        </p:txBody>
-      </p:sp>
-      <p:sp>
-        <p:nvSpPr>
-          <p:cNvPr id="1" name="PlaceHolder 2"/>
+            <a:endParaRPr lang="et-EE" sz="19870" b="0" strike="noStrike" spc="-1">
+              <a:solidFill>
+                <a:srgbClr val="000000"/>
+              </a:solidFill>
+              <a:uFill>
+                <a:solidFill>
+                  <a:srgbClr val="FFFFFF"/>
+                </a:solidFill>
+              </a:uFill>
+              <a:latin typeface="Calibri"/>
+            </a:endParaRPr>
+          </a:p>
+        </p:txBody>
+      </p:sp>
+      <p:sp>
+        <p:nvSpPr>
+          <p:cNvPr id="6" name="PlaceHolder 2"/>
           <p:cNvSpPr>
             <a:spLocks noGrp="1"/>
           </p:cNvSpPr>
@@ -1674,6 +1848,7 @@
         </p:spPr>
         <p:txBody>
           <a:bodyPr anchor="ctr"/>
+          <a:lstStyle/>
           <a:p>
             <a:pPr>
               <a:lnSpc>
@@ -1681,26 +1856,26 @@
               </a:lnSpc>
             </a:pPr>
             <a:fld id="{E10B9D78-0CB5-4FCE-B222-163E79FEF463}" type="datetime">
-              <a:rPr b="0" lang="en-GB" sz="3980" spc="-1" strike="noStrike">
-                <a:solidFill>
-                  <a:srgbClr val="8b8b8b"/>
+              <a:rPr lang="en-GB" sz="3980" b="0" strike="noStrike" spc="-1">
+                <a:solidFill>
+                  <a:srgbClr val="8B8B8B"/>
                 </a:solidFill>
                 <a:uFill>
                   <a:solidFill>
-                    <a:srgbClr val="ffffff"/>
+                    <a:srgbClr val="FFFFFF"/>
                   </a:solidFill>
                 </a:uFill>
                 <a:latin typeface="Calibri"/>
               </a:rPr>
-              <a:t>16/12/19</a:t>
+              <a:t>16/12/2019</a:t>
             </a:fld>
-            <a:endParaRPr b="0" lang="en-GB" sz="1400" spc="-1" strike="noStrike">
-              <a:solidFill>
-                <a:srgbClr val="000000"/>
-              </a:solidFill>
-              <a:uFill>
-                <a:solidFill>
-                  <a:srgbClr val="ffffff"/>
+            <a:endParaRPr lang="en-GB" sz="1400" b="0" strike="noStrike" spc="-1">
+              <a:solidFill>
+                <a:srgbClr val="000000"/>
+              </a:solidFill>
+              <a:uFill>
+                <a:solidFill>
+                  <a:srgbClr val="FFFFFF"/>
                 </a:solidFill>
               </a:uFill>
               <a:latin typeface="Times New Roman"/>
@@ -1729,14 +1904,15 @@
         </p:spPr>
         <p:txBody>
           <a:bodyPr anchor="ctr"/>
-          <a:p>
-            <a:endParaRPr b="0" lang="en-GB" sz="2400" spc="-1" strike="noStrike">
-              <a:solidFill>
-                <a:srgbClr val="000000"/>
-              </a:solidFill>
-              <a:uFill>
-                <a:solidFill>
-                  <a:srgbClr val="ffffff"/>
+          <a:lstStyle/>
+          <a:p>
+            <a:endParaRPr lang="en-GB" sz="2400" b="0" strike="noStrike" spc="-1">
+              <a:solidFill>
+                <a:srgbClr val="000000"/>
+              </a:solidFill>
+              <a:uFill>
+                <a:solidFill>
+                  <a:srgbClr val="FFFFFF"/>
                 </a:solidFill>
               </a:uFill>
               <a:latin typeface="Times New Roman"/>
@@ -1765,6 +1941,7 @@
         </p:spPr>
         <p:txBody>
           <a:bodyPr anchor="ctr"/>
+          <a:lstStyle/>
           <a:p>
             <a:pPr algn="r">
               <a:lnSpc>
@@ -1772,26 +1949,26 @@
               </a:lnSpc>
             </a:pPr>
             <a:fld id="{A821E9DA-A39E-48A0-8671-88438233A3A0}" type="slidenum">
-              <a:rPr b="0" lang="en-GB" sz="3980" spc="-1" strike="noStrike">
-                <a:solidFill>
-                  <a:srgbClr val="8b8b8b"/>
+              <a:rPr lang="en-GB" sz="3980" b="0" strike="noStrike" spc="-1">
+                <a:solidFill>
+                  <a:srgbClr val="8B8B8B"/>
                 </a:solidFill>
                 <a:uFill>
                   <a:solidFill>
-                    <a:srgbClr val="ffffff"/>
+                    <a:srgbClr val="FFFFFF"/>
                   </a:solidFill>
                 </a:uFill>
                 <a:latin typeface="Calibri"/>
               </a:rPr>
-              <a:t>&lt;number&gt;</a:t>
+              <a:t>‹#›</a:t>
             </a:fld>
-            <a:endParaRPr b="0" lang="en-GB" sz="1400" spc="-1" strike="noStrike">
-              <a:solidFill>
-                <a:srgbClr val="000000"/>
-              </a:solidFill>
-              <a:uFill>
-                <a:solidFill>
-                  <a:srgbClr val="ffffff"/>
+            <a:endParaRPr lang="en-GB" sz="1400" b="0" strike="noStrike" spc="-1">
+              <a:solidFill>
+                <a:srgbClr val="000000"/>
+              </a:solidFill>
+              <a:uFill>
+                <a:solidFill>
+                  <a:srgbClr val="FFFFFF"/>
                 </a:solidFill>
               </a:uFill>
               <a:latin typeface="Times New Roman"/>
@@ -1819,7 +1996,8 @@
           </a:prstGeom>
         </p:spPr>
         <p:txBody>
-          <a:bodyPr lIns="0" rIns="0" tIns="0" bIns="0"/>
+          <a:bodyPr lIns="0" tIns="0" rIns="0" bIns="0"/>
+          <a:lstStyle/>
           <a:p>
             <a:pPr marL="432000" indent="-324000">
               <a:buClr>
@@ -1830,33 +2008,22 @@
               <a:buChar char=""/>
             </a:pPr>
             <a:r>
-              <a:rPr b="0" lang="et-EE" sz="9270" spc="-1" strike="noStrike">
+              <a:rPr lang="et-EE" sz="9270" b="0" strike="noStrike" spc="-1">
                 <a:solidFill>
                   <a:srgbClr val="000000"/>
                 </a:solidFill>
                 <a:uFill>
                   <a:solidFill>
-                    <a:srgbClr val="ffffff"/>
+                    <a:srgbClr val="FFFFFF"/>
                   </a:solidFill>
                 </a:uFill>
                 <a:latin typeface="Calibri"/>
               </a:rPr>
               <a:t>Click to edit the outline text format</a:t>
             </a:r>
-            <a:endParaRPr b="0" lang="et-EE" sz="9270" spc="-1" strike="noStrike">
-              <a:solidFill>
-                <a:srgbClr val="000000"/>
-              </a:solidFill>
-              <a:uFill>
-                <a:solidFill>
-                  <a:srgbClr val="ffffff"/>
-                </a:solidFill>
-              </a:uFill>
-              <a:latin typeface="Calibri"/>
-            </a:endParaRPr>
-          </a:p>
-          <a:p>
-            <a:pPr lvl="1" marL="864000" indent="-324000">
+          </a:p>
+          <a:p>
+            <a:pPr marL="864000" lvl="1" indent="-324000">
               <a:buClr>
                 <a:srgbClr val="000000"/>
               </a:buClr>
@@ -1865,33 +2032,22 @@
               <a:buChar char=""/>
             </a:pPr>
             <a:r>
-              <a:rPr b="0" lang="et-EE" sz="6619" spc="-1" strike="noStrike">
+              <a:rPr lang="et-EE" sz="6619" b="0" strike="noStrike" spc="-1">
                 <a:solidFill>
                   <a:srgbClr val="000000"/>
                 </a:solidFill>
                 <a:uFill>
                   <a:solidFill>
-                    <a:srgbClr val="ffffff"/>
+                    <a:srgbClr val="FFFFFF"/>
                   </a:solidFill>
                 </a:uFill>
                 <a:latin typeface="Calibri"/>
               </a:rPr>
               <a:t>Second Outline Level</a:t>
             </a:r>
-            <a:endParaRPr b="0" lang="et-EE" sz="6619" spc="-1" strike="noStrike">
-              <a:solidFill>
-                <a:srgbClr val="000000"/>
-              </a:solidFill>
-              <a:uFill>
-                <a:solidFill>
-                  <a:srgbClr val="ffffff"/>
-                </a:solidFill>
-              </a:uFill>
-              <a:latin typeface="Calibri"/>
-            </a:endParaRPr>
-          </a:p>
-          <a:p>
-            <a:pPr lvl="2" marL="1296000" indent="-288000">
+          </a:p>
+          <a:p>
+            <a:pPr marL="1296000" lvl="2" indent="-288000">
               <a:buClr>
                 <a:srgbClr val="000000"/>
               </a:buClr>
@@ -1900,33 +2056,22 @@
               <a:buChar char=""/>
             </a:pPr>
             <a:r>
-              <a:rPr b="0" lang="et-EE" sz="5960" spc="-1" strike="noStrike">
+              <a:rPr lang="et-EE" sz="5960" b="0" strike="noStrike" spc="-1">
                 <a:solidFill>
                   <a:srgbClr val="000000"/>
                 </a:solidFill>
                 <a:uFill>
                   <a:solidFill>
-                    <a:srgbClr val="ffffff"/>
+                    <a:srgbClr val="FFFFFF"/>
                   </a:solidFill>
                 </a:uFill>
                 <a:latin typeface="Calibri"/>
               </a:rPr>
               <a:t>Third Outline Level</a:t>
             </a:r>
-            <a:endParaRPr b="0" lang="et-EE" sz="5960" spc="-1" strike="noStrike">
-              <a:solidFill>
-                <a:srgbClr val="000000"/>
-              </a:solidFill>
-              <a:uFill>
-                <a:solidFill>
-                  <a:srgbClr val="ffffff"/>
-                </a:solidFill>
-              </a:uFill>
-              <a:latin typeface="Calibri"/>
-            </a:endParaRPr>
-          </a:p>
-          <a:p>
-            <a:pPr lvl="3" marL="1728000" indent="-216000">
+          </a:p>
+          <a:p>
+            <a:pPr marL="1728000" lvl="3" indent="-216000">
               <a:buClr>
                 <a:srgbClr val="000000"/>
               </a:buClr>
@@ -1935,33 +2080,22 @@
               <a:buChar char=""/>
             </a:pPr>
             <a:r>
-              <a:rPr b="0" lang="et-EE" sz="5960" spc="-1" strike="noStrike">
+              <a:rPr lang="et-EE" sz="5960" b="0" strike="noStrike" spc="-1">
                 <a:solidFill>
                   <a:srgbClr val="000000"/>
                 </a:solidFill>
                 <a:uFill>
                   <a:solidFill>
-                    <a:srgbClr val="ffffff"/>
+                    <a:srgbClr val="FFFFFF"/>
                   </a:solidFill>
                 </a:uFill>
                 <a:latin typeface="Calibri"/>
               </a:rPr>
               <a:t>Fourth Outline Level</a:t>
             </a:r>
-            <a:endParaRPr b="0" lang="et-EE" sz="5960" spc="-1" strike="noStrike">
-              <a:solidFill>
-                <a:srgbClr val="000000"/>
-              </a:solidFill>
-              <a:uFill>
-                <a:solidFill>
-                  <a:srgbClr val="ffffff"/>
-                </a:solidFill>
-              </a:uFill>
-              <a:latin typeface="Calibri"/>
-            </a:endParaRPr>
-          </a:p>
-          <a:p>
-            <a:pPr lvl="4" marL="2160000" indent="-216000">
+          </a:p>
+          <a:p>
+            <a:pPr marL="2160000" lvl="4" indent="-216000">
               <a:buClr>
                 <a:srgbClr val="000000"/>
               </a:buClr>
@@ -1970,33 +2104,22 @@
               <a:buChar char=""/>
             </a:pPr>
             <a:r>
-              <a:rPr b="0" lang="et-EE" sz="2000" spc="-1" strike="noStrike">
+              <a:rPr lang="et-EE" sz="2000" b="0" strike="noStrike" spc="-1">
                 <a:solidFill>
                   <a:srgbClr val="000000"/>
                 </a:solidFill>
                 <a:uFill>
                   <a:solidFill>
-                    <a:srgbClr val="ffffff"/>
+                    <a:srgbClr val="FFFFFF"/>
                   </a:solidFill>
                 </a:uFill>
                 <a:latin typeface="Calibri"/>
               </a:rPr>
               <a:t>Fifth Outline Level</a:t>
             </a:r>
-            <a:endParaRPr b="0" lang="et-EE" sz="2000" spc="-1" strike="noStrike">
-              <a:solidFill>
-                <a:srgbClr val="000000"/>
-              </a:solidFill>
-              <a:uFill>
-                <a:solidFill>
-                  <a:srgbClr val="ffffff"/>
-                </a:solidFill>
-              </a:uFill>
-              <a:latin typeface="Calibri"/>
-            </a:endParaRPr>
-          </a:p>
-          <a:p>
-            <a:pPr lvl="5" marL="2592000" indent="-216000">
+          </a:p>
+          <a:p>
+            <a:pPr marL="2592000" lvl="5" indent="-216000">
               <a:buClr>
                 <a:srgbClr val="000000"/>
               </a:buClr>
@@ -2005,33 +2128,22 @@
               <a:buChar char=""/>
             </a:pPr>
             <a:r>
-              <a:rPr b="0" lang="et-EE" sz="2000" spc="-1" strike="noStrike">
+              <a:rPr lang="et-EE" sz="2000" b="0" strike="noStrike" spc="-1">
                 <a:solidFill>
                   <a:srgbClr val="000000"/>
                 </a:solidFill>
                 <a:uFill>
                   <a:solidFill>
-                    <a:srgbClr val="ffffff"/>
+                    <a:srgbClr val="FFFFFF"/>
                   </a:solidFill>
                 </a:uFill>
                 <a:latin typeface="Calibri"/>
               </a:rPr>
               <a:t>Sixth Outline Level</a:t>
             </a:r>
-            <a:endParaRPr b="0" lang="et-EE" sz="2000" spc="-1" strike="noStrike">
-              <a:solidFill>
-                <a:srgbClr val="000000"/>
-              </a:solidFill>
-              <a:uFill>
-                <a:solidFill>
-                  <a:srgbClr val="ffffff"/>
-                </a:solidFill>
-              </a:uFill>
-              <a:latin typeface="Calibri"/>
-            </a:endParaRPr>
-          </a:p>
-          <a:p>
-            <a:pPr lvl="6" marL="3024000" indent="-216000">
+          </a:p>
+          <a:p>
+            <a:pPr marL="3024000" lvl="6" indent="-216000">
               <a:buClr>
                 <a:srgbClr val="000000"/>
               </a:buClr>
@@ -2040,61 +2152,331 @@
               <a:buChar char=""/>
             </a:pPr>
             <a:r>
-              <a:rPr b="0" lang="et-EE" sz="2000" spc="-1" strike="noStrike">
+              <a:rPr lang="et-EE" sz="2000" b="0" strike="noStrike" spc="-1">
                 <a:solidFill>
                   <a:srgbClr val="000000"/>
                 </a:solidFill>
                 <a:uFill>
                   <a:solidFill>
-                    <a:srgbClr val="ffffff"/>
+                    <a:srgbClr val="FFFFFF"/>
                   </a:solidFill>
                 </a:uFill>
                 <a:latin typeface="Calibri"/>
               </a:rPr>
               <a:t>Seventh Outline Level</a:t>
             </a:r>
-            <a:endParaRPr b="0" lang="et-EE" sz="2000" spc="-1" strike="noStrike">
-              <a:solidFill>
-                <a:srgbClr val="000000"/>
-              </a:solidFill>
-              <a:uFill>
-                <a:solidFill>
-                  <a:srgbClr val="ffffff"/>
-                </a:solidFill>
-              </a:uFill>
-              <a:latin typeface="Calibri"/>
-            </a:endParaRPr>
           </a:p>
         </p:txBody>
       </p:sp>
     </p:spTree>
   </p:cSld>
-  <p:clrMap bg1="lt1" bg2="lt2" tx1="dk1" tx2="dk2" accent1="accent1" accent2="accent2" accent3="accent3" accent4="accent4" accent5="accent5" accent6="accent6" hlink="hlink" folHlink="folHlink"/>
+  <p:clrMap bg1="lt1" tx1="dk1" bg2="lt2" tx2="dk2" accent1="accent1" accent2="accent2" accent3="accent3" accent4="accent4" accent5="accent5" accent6="accent6" hlink="hlink" folHlink="folHlink"/>
   <p:sldLayoutIdLst>
-    <p:sldLayoutId id="2147483649" r:id="rId2"/>
-    <p:sldLayoutId id="2147483650" r:id="rId3"/>
-    <p:sldLayoutId id="2147483651" r:id="rId4"/>
-    <p:sldLayoutId id="2147483652" r:id="rId5"/>
-    <p:sldLayoutId id="2147483653" r:id="rId6"/>
-    <p:sldLayoutId id="2147483654" r:id="rId7"/>
-    <p:sldLayoutId id="2147483655" r:id="rId8"/>
-    <p:sldLayoutId id="2147483656" r:id="rId9"/>
-    <p:sldLayoutId id="2147483657" r:id="rId10"/>
-    <p:sldLayoutId id="2147483658" r:id="rId11"/>
-    <p:sldLayoutId id="2147483659" r:id="rId12"/>
-    <p:sldLayoutId id="2147483660" r:id="rId13"/>
+    <p:sldLayoutId id="2147483649" r:id="rId1"/>
+    <p:sldLayoutId id="2147483650" r:id="rId2"/>
+    <p:sldLayoutId id="2147483651" r:id="rId3"/>
+    <p:sldLayoutId id="2147483652" r:id="rId4"/>
+    <p:sldLayoutId id="2147483653" r:id="rId5"/>
+    <p:sldLayoutId id="2147483654" r:id="rId6"/>
+    <p:sldLayoutId id="2147483655" r:id="rId7"/>
+    <p:sldLayoutId id="2147483656" r:id="rId8"/>
+    <p:sldLayoutId id="2147483657" r:id="rId9"/>
+    <p:sldLayoutId id="2147483658" r:id="rId10"/>
+    <p:sldLayoutId id="2147483659" r:id="rId11"/>
+    <p:sldLayoutId id="2147483660" r:id="rId12"/>
   </p:sldLayoutIdLst>
+  <p:txStyles>
+    <p:titleStyle>
+      <a:lvl1pPr algn="l" defTabSz="914400" rtl="0" eaLnBrk="1" latinLnBrk="0" hangingPunct="1">
+        <a:lnSpc>
+          <a:spcPct val="90000"/>
+        </a:lnSpc>
+        <a:spcBef>
+          <a:spcPct val="0"/>
+        </a:spcBef>
+        <a:buNone/>
+        <a:defRPr sz="4400" kern="1200">
+          <a:solidFill>
+            <a:schemeClr val="tx1"/>
+          </a:solidFill>
+          <a:latin typeface="+mj-lt"/>
+          <a:ea typeface="+mj-ea"/>
+          <a:cs typeface="+mj-cs"/>
+        </a:defRPr>
+      </a:lvl1pPr>
+    </p:titleStyle>
+    <p:bodyStyle>
+      <a:lvl1pPr marL="228600" indent="-228600" algn="l" defTabSz="914400" rtl="0" eaLnBrk="1" latinLnBrk="0" hangingPunct="1">
+        <a:lnSpc>
+          <a:spcPct val="90000"/>
+        </a:lnSpc>
+        <a:spcBef>
+          <a:spcPts val="1000"/>
+        </a:spcBef>
+        <a:buFont typeface="Arial" panose="020B0604020202020204" pitchFamily="34" charset="0"/>
+        <a:buChar char="•"/>
+        <a:defRPr sz="2800" kern="1200">
+          <a:solidFill>
+            <a:schemeClr val="tx1"/>
+          </a:solidFill>
+          <a:latin typeface="+mn-lt"/>
+          <a:ea typeface="+mn-ea"/>
+          <a:cs typeface="+mn-cs"/>
+        </a:defRPr>
+      </a:lvl1pPr>
+      <a:lvl2pPr marL="685800" indent="-228600" algn="l" defTabSz="914400" rtl="0" eaLnBrk="1" latinLnBrk="0" hangingPunct="1">
+        <a:lnSpc>
+          <a:spcPct val="90000"/>
+        </a:lnSpc>
+        <a:spcBef>
+          <a:spcPts val="500"/>
+        </a:spcBef>
+        <a:buFont typeface="Arial" panose="020B0604020202020204" pitchFamily="34" charset="0"/>
+        <a:buChar char="•"/>
+        <a:defRPr sz="2400" kern="1200">
+          <a:solidFill>
+            <a:schemeClr val="tx1"/>
+          </a:solidFill>
+          <a:latin typeface="+mn-lt"/>
+          <a:ea typeface="+mn-ea"/>
+          <a:cs typeface="+mn-cs"/>
+        </a:defRPr>
+      </a:lvl2pPr>
+      <a:lvl3pPr marL="1143000" indent="-228600" algn="l" defTabSz="914400" rtl="0" eaLnBrk="1" latinLnBrk="0" hangingPunct="1">
+        <a:lnSpc>
+          <a:spcPct val="90000"/>
+        </a:lnSpc>
+        <a:spcBef>
+          <a:spcPts val="500"/>
+        </a:spcBef>
+        <a:buFont typeface="Arial" panose="020B0604020202020204" pitchFamily="34" charset="0"/>
+        <a:buChar char="•"/>
+        <a:defRPr sz="2000" kern="1200">
+          <a:solidFill>
+            <a:schemeClr val="tx1"/>
+          </a:solidFill>
+          <a:latin typeface="+mn-lt"/>
+          <a:ea typeface="+mn-ea"/>
+          <a:cs typeface="+mn-cs"/>
+        </a:defRPr>
+      </a:lvl3pPr>
+      <a:lvl4pPr marL="1600200" indent="-228600" algn="l" defTabSz="914400" rtl="0" eaLnBrk="1" latinLnBrk="0" hangingPunct="1">
+        <a:lnSpc>
+          <a:spcPct val="90000"/>
+        </a:lnSpc>
+        <a:spcBef>
+          <a:spcPts val="500"/>
+        </a:spcBef>
+        <a:buFont typeface="Arial" panose="020B0604020202020204" pitchFamily="34" charset="0"/>
+        <a:buChar char="•"/>
+        <a:defRPr sz="1800" kern="1200">
+          <a:solidFill>
+            <a:schemeClr val="tx1"/>
+          </a:solidFill>
+          <a:latin typeface="+mn-lt"/>
+          <a:ea typeface="+mn-ea"/>
+          <a:cs typeface="+mn-cs"/>
+        </a:defRPr>
+      </a:lvl4pPr>
+      <a:lvl5pPr marL="2057400" indent="-228600" algn="l" defTabSz="914400" rtl="0" eaLnBrk="1" latinLnBrk="0" hangingPunct="1">
+        <a:lnSpc>
+          <a:spcPct val="90000"/>
+        </a:lnSpc>
+        <a:spcBef>
+          <a:spcPts val="500"/>
+        </a:spcBef>
+        <a:buFont typeface="Arial" panose="020B0604020202020204" pitchFamily="34" charset="0"/>
+        <a:buChar char="•"/>
+        <a:defRPr sz="1800" kern="1200">
+          <a:solidFill>
+            <a:schemeClr val="tx1"/>
+          </a:solidFill>
+          <a:latin typeface="+mn-lt"/>
+          <a:ea typeface="+mn-ea"/>
+          <a:cs typeface="+mn-cs"/>
+        </a:defRPr>
+      </a:lvl5pPr>
+      <a:lvl6pPr marL="2514600" indent="-228600" algn="l" defTabSz="914400" rtl="0" eaLnBrk="1" latinLnBrk="0" hangingPunct="1">
+        <a:lnSpc>
+          <a:spcPct val="90000"/>
+        </a:lnSpc>
+        <a:spcBef>
+          <a:spcPts val="500"/>
+        </a:spcBef>
+        <a:buFont typeface="Arial" panose="020B0604020202020204" pitchFamily="34" charset="0"/>
+        <a:buChar char="•"/>
+        <a:defRPr sz="1800" kern="1200">
+          <a:solidFill>
+            <a:schemeClr val="tx1"/>
+          </a:solidFill>
+          <a:latin typeface="+mn-lt"/>
+          <a:ea typeface="+mn-ea"/>
+          <a:cs typeface="+mn-cs"/>
+        </a:defRPr>
+      </a:lvl6pPr>
+      <a:lvl7pPr marL="2971800" indent="-228600" algn="l" defTabSz="914400" rtl="0" eaLnBrk="1" latinLnBrk="0" hangingPunct="1">
+        <a:lnSpc>
+          <a:spcPct val="90000"/>
+        </a:lnSpc>
+        <a:spcBef>
+          <a:spcPts val="500"/>
+        </a:spcBef>
+        <a:buFont typeface="Arial" panose="020B0604020202020204" pitchFamily="34" charset="0"/>
+        <a:buChar char="•"/>
+        <a:defRPr sz="1800" kern="1200">
+          <a:solidFill>
+            <a:schemeClr val="tx1"/>
+          </a:solidFill>
+          <a:latin typeface="+mn-lt"/>
+          <a:ea typeface="+mn-ea"/>
+          <a:cs typeface="+mn-cs"/>
+        </a:defRPr>
+      </a:lvl7pPr>
+      <a:lvl8pPr marL="3429000" indent="-228600" algn="l" defTabSz="914400" rtl="0" eaLnBrk="1" latinLnBrk="0" hangingPunct="1">
+        <a:lnSpc>
+          <a:spcPct val="90000"/>
+        </a:lnSpc>
+        <a:spcBef>
+          <a:spcPts val="500"/>
+        </a:spcBef>
+        <a:buFont typeface="Arial" panose="020B0604020202020204" pitchFamily="34" charset="0"/>
+        <a:buChar char="•"/>
+        <a:defRPr sz="1800" kern="1200">
+          <a:solidFill>
+            <a:schemeClr val="tx1"/>
+          </a:solidFill>
+          <a:latin typeface="+mn-lt"/>
+          <a:ea typeface="+mn-ea"/>
+          <a:cs typeface="+mn-cs"/>
+        </a:defRPr>
+      </a:lvl8pPr>
+      <a:lvl9pPr marL="3886200" indent="-228600" algn="l" defTabSz="914400" rtl="0" eaLnBrk="1" latinLnBrk="0" hangingPunct="1">
+        <a:lnSpc>
+          <a:spcPct val="90000"/>
+        </a:lnSpc>
+        <a:spcBef>
+          <a:spcPts val="500"/>
+        </a:spcBef>
+        <a:buFont typeface="Arial" panose="020B0604020202020204" pitchFamily="34" charset="0"/>
+        <a:buChar char="•"/>
+        <a:defRPr sz="1800" kern="1200">
+          <a:solidFill>
+            <a:schemeClr val="tx1"/>
+          </a:solidFill>
+          <a:latin typeface="+mn-lt"/>
+          <a:ea typeface="+mn-ea"/>
+          <a:cs typeface="+mn-cs"/>
+        </a:defRPr>
+      </a:lvl9pPr>
+    </p:bodyStyle>
+    <p:otherStyle>
+      <a:defPPr>
+        <a:defRPr lang="et-EE"/>
+      </a:defPPr>
+      <a:lvl1pPr marL="0" algn="l" defTabSz="914400" rtl="0" eaLnBrk="1" latinLnBrk="0" hangingPunct="1">
+        <a:defRPr sz="1800" kern="1200">
+          <a:solidFill>
+            <a:schemeClr val="tx1"/>
+          </a:solidFill>
+          <a:latin typeface="+mn-lt"/>
+          <a:ea typeface="+mn-ea"/>
+          <a:cs typeface="+mn-cs"/>
+        </a:defRPr>
+      </a:lvl1pPr>
+      <a:lvl2pPr marL="457200" algn="l" defTabSz="914400" rtl="0" eaLnBrk="1" latinLnBrk="0" hangingPunct="1">
+        <a:defRPr sz="1800" kern="1200">
+          <a:solidFill>
+            <a:schemeClr val="tx1"/>
+          </a:solidFill>
+          <a:latin typeface="+mn-lt"/>
+          <a:ea typeface="+mn-ea"/>
+          <a:cs typeface="+mn-cs"/>
+        </a:defRPr>
+      </a:lvl2pPr>
+      <a:lvl3pPr marL="914400" algn="l" defTabSz="914400" rtl="0" eaLnBrk="1" latinLnBrk="0" hangingPunct="1">
+        <a:defRPr sz="1800" kern="1200">
+          <a:solidFill>
+            <a:schemeClr val="tx1"/>
+          </a:solidFill>
+          <a:latin typeface="+mn-lt"/>
+          <a:ea typeface="+mn-ea"/>
+          <a:cs typeface="+mn-cs"/>
+        </a:defRPr>
+      </a:lvl3pPr>
+      <a:lvl4pPr marL="1371600" algn="l" defTabSz="914400" rtl="0" eaLnBrk="1" latinLnBrk="0" hangingPunct="1">
+        <a:defRPr sz="1800" kern="1200">
+          <a:solidFill>
+            <a:schemeClr val="tx1"/>
+          </a:solidFill>
+          <a:latin typeface="+mn-lt"/>
+          <a:ea typeface="+mn-ea"/>
+          <a:cs typeface="+mn-cs"/>
+        </a:defRPr>
+      </a:lvl4pPr>
+      <a:lvl5pPr marL="1828800" algn="l" defTabSz="914400" rtl="0" eaLnBrk="1" latinLnBrk="0" hangingPunct="1">
+        <a:defRPr sz="1800" kern="1200">
+          <a:solidFill>
+            <a:schemeClr val="tx1"/>
+          </a:solidFill>
+          <a:latin typeface="+mn-lt"/>
+          <a:ea typeface="+mn-ea"/>
+          <a:cs typeface="+mn-cs"/>
+        </a:defRPr>
+      </a:lvl5pPr>
+      <a:lvl6pPr marL="2286000" algn="l" defTabSz="914400" rtl="0" eaLnBrk="1" latinLnBrk="0" hangingPunct="1">
+        <a:defRPr sz="1800" kern="1200">
+          <a:solidFill>
+            <a:schemeClr val="tx1"/>
+          </a:solidFill>
+          <a:latin typeface="+mn-lt"/>
+          <a:ea typeface="+mn-ea"/>
+          <a:cs typeface="+mn-cs"/>
+        </a:defRPr>
+      </a:lvl6pPr>
+      <a:lvl7pPr marL="2743200" algn="l" defTabSz="914400" rtl="0" eaLnBrk="1" latinLnBrk="0" hangingPunct="1">
+        <a:defRPr sz="1800" kern="1200">
+          <a:solidFill>
+            <a:schemeClr val="tx1"/>
+          </a:solidFill>
+          <a:latin typeface="+mn-lt"/>
+          <a:ea typeface="+mn-ea"/>
+          <a:cs typeface="+mn-cs"/>
+        </a:defRPr>
+      </a:lvl7pPr>
+      <a:lvl8pPr marL="3200400" algn="l" defTabSz="914400" rtl="0" eaLnBrk="1" latinLnBrk="0" hangingPunct="1">
+        <a:defRPr sz="1800" kern="1200">
+          <a:solidFill>
+            <a:schemeClr val="tx1"/>
+          </a:solidFill>
+          <a:latin typeface="+mn-lt"/>
+          <a:ea typeface="+mn-ea"/>
+          <a:cs typeface="+mn-cs"/>
+        </a:defRPr>
+      </a:lvl8pPr>
+      <a:lvl9pPr marL="3657600" algn="l" defTabSz="914400" rtl="0" eaLnBrk="1" latinLnBrk="0" hangingPunct="1">
+        <a:defRPr sz="1800" kern="1200">
+          <a:solidFill>
+            <a:schemeClr val="tx1"/>
+          </a:solidFill>
+          <a:latin typeface="+mn-lt"/>
+          <a:ea typeface="+mn-ea"/>
+          <a:cs typeface="+mn-cs"/>
+        </a:defRPr>
+      </a:lvl9pPr>
+    </p:otherStyle>
+  </p:txStyles>
 </p:sldMaster>
 </file>
 
 <file path=ppt/slides/slide1.xml><?xml version="1.0" encoding="utf-8"?>
-<p:sld xmlns:a="http://schemas.openxmlformats.org/drawingml/2006/main" xmlns:p="http://schemas.openxmlformats.org/presentationml/2006/main" xmlns:r="http://schemas.openxmlformats.org/officeDocument/2006/relationships" xmlns:p14="http://schemas.microsoft.com/office/powerpoint/2010/main" xmlns:p15="http://schemas.microsoft.com/office/powerpoint/2012/main" xmlns:mc="http://schemas.openxmlformats.org/markup-compatibility/2006">
+<p:sld xmlns:a="http://schemas.openxmlformats.org/drawingml/2006/main" xmlns:r="http://schemas.openxmlformats.org/officeDocument/2006/relationships" xmlns:p="http://schemas.openxmlformats.org/presentationml/2006/main">
   <p:cSld>
     <p:bg>
       <p:bgPr>
         <a:solidFill>
-          <a:srgbClr val="ffffff"/>
+          <a:srgbClr val="FFFFFF"/>
         </a:solidFill>
+        <a:effectLst/>
       </p:bgPr>
     </p:bg>
     <p:spTree>
@@ -2113,13 +2495,13 @@
       </p:grpSpPr>
       <p:pic>
         <p:nvPicPr>
-          <p:cNvPr id="41" name="Pilt 3" descr=""/>
+          <p:cNvPr id="41" name="Pilt 3"/>
           <p:cNvPicPr/>
           <p:nvPr/>
         </p:nvPicPr>
         <p:blipFill>
-          <a:blip r:embed="rId1"/>
-          <a:srcRect l="0" t="4710" r="0" b="0"/>
+          <a:blip r:embed="rId2"/>
+          <a:srcRect t="4710"/>
           <a:stretch/>
         </p:blipFill>
         <p:spPr>
@@ -2156,14 +2538,15 @@
         </p:spPr>
         <p:txBody>
           <a:bodyPr anchor="b"/>
-          <a:p>
-            <a:endParaRPr b="0" lang="et-EE" sz="6869" spc="-1" strike="noStrike">
-              <a:solidFill>
-                <a:srgbClr val="000000"/>
-              </a:solidFill>
-              <a:uFill>
-                <a:solidFill>
-                  <a:srgbClr val="ffffff"/>
+          <a:lstStyle/>
+          <a:p>
+            <a:endParaRPr lang="et-EE" sz="6869" b="0" strike="noStrike" spc="-1">
+              <a:solidFill>
+                <a:srgbClr val="000000"/>
+              </a:solidFill>
+              <a:uFill>
+                <a:solidFill>
+                  <a:srgbClr val="FFFFFF"/>
                 </a:solidFill>
               </a:uFill>
               <a:latin typeface="Calibri"/>
@@ -2191,13 +2574,20 @@
           </a:ln>
         </p:spPr>
         <p:style>
-          <a:lnRef idx="0"/>
-          <a:fillRef idx="0"/>
-          <a:effectRef idx="0"/>
+          <a:lnRef idx="0">
+            <a:scrgbClr r="0" g="0" b="0"/>
+          </a:lnRef>
+          <a:fillRef idx="0">
+            <a:scrgbClr r="0" g="0" b="0"/>
+          </a:fillRef>
+          <a:effectRef idx="0">
+            <a:scrgbClr r="0" g="0" b="0"/>
+          </a:effectRef>
           <a:fontRef idx="minor"/>
         </p:style>
         <p:txBody>
-          <a:bodyPr lIns="90000" rIns="90000" tIns="45000" bIns="45000"/>
+          <a:bodyPr lIns="90000" tIns="45000" rIns="90000" bIns="45000"/>
+          <a:lstStyle/>
           <a:p>
             <a:pPr algn="ctr">
               <a:lnSpc>
@@ -2205,26 +2595,26 @@
               </a:lnSpc>
             </a:pPr>
             <a:r>
-              <a:rPr b="0" lang="en-GB" sz="11000" spc="-1" strike="noStrike">
-                <a:solidFill>
-                  <a:srgbClr val="ffffff"/>
+              <a:rPr lang="en-GB" sz="11000" b="0" strike="noStrike" spc="-1">
+                <a:solidFill>
+                  <a:srgbClr val="FFFFFF"/>
                 </a:solidFill>
                 <a:uFill>
                   <a:solidFill>
-                    <a:srgbClr val="ffffff"/>
+                    <a:srgbClr val="FFFFFF"/>
                   </a:solidFill>
                 </a:uFill>
                 <a:latin typeface="Times New Roman"/>
               </a:rPr>
               <a:t>PREDICTING A MOVIE’S BOX OFFICE AND ANALYZING IT’S KEY FEATURES</a:t>
             </a:r>
-            <a:endParaRPr b="0" lang="en-GB" sz="6869" spc="-1" strike="noStrike">
-              <a:solidFill>
-                <a:srgbClr val="000000"/>
-              </a:solidFill>
-              <a:uFill>
-                <a:solidFill>
-                  <a:srgbClr val="ffffff"/>
+            <a:endParaRPr lang="en-GB" sz="6869" b="0" strike="noStrike" spc="-1">
+              <a:solidFill>
+                <a:srgbClr val="000000"/>
+              </a:solidFill>
+              <a:uFill>
+                <a:solidFill>
+                  <a:srgbClr val="FFFFFF"/>
                 </a:solidFill>
               </a:uFill>
               <a:latin typeface="Arial"/>
@@ -2237,26 +2627,26 @@
               </a:lnSpc>
             </a:pPr>
             <a:r>
-              <a:rPr b="0" lang="en-GB" sz="8000" spc="-1" strike="noStrike">
-                <a:solidFill>
-                  <a:srgbClr val="ffffff"/>
+              <a:rPr lang="en-GB" sz="8000" b="0" strike="noStrike" spc="-1">
+                <a:solidFill>
+                  <a:srgbClr val="FFFFFF"/>
                 </a:solidFill>
                 <a:uFill>
                   <a:solidFill>
-                    <a:srgbClr val="ffffff"/>
+                    <a:srgbClr val="FFFFFF"/>
                   </a:solidFill>
                 </a:uFill>
                 <a:latin typeface="Times New Roman"/>
               </a:rPr>
               <a:t>Silver Spitsõn, Karen Saksakulm</a:t>
             </a:r>
-            <a:endParaRPr b="0" lang="en-GB" sz="6869" spc="-1" strike="noStrike">
-              <a:solidFill>
-                <a:srgbClr val="000000"/>
-              </a:solidFill>
-              <a:uFill>
-                <a:solidFill>
-                  <a:srgbClr val="ffffff"/>
+            <a:endParaRPr lang="en-GB" sz="6869" b="0" strike="noStrike" spc="-1">
+              <a:solidFill>
+                <a:srgbClr val="000000"/>
+              </a:solidFill>
+              <a:uFill>
+                <a:solidFill>
+                  <a:srgbClr val="FFFFFF"/>
                 </a:solidFill>
               </a:uFill>
               <a:latin typeface="Arial"/>
@@ -2266,12 +2656,12 @@
       </p:sp>
       <p:pic>
         <p:nvPicPr>
-          <p:cNvPr id="44" name="Pilt 5" descr=""/>
+          <p:cNvPr id="44" name="Pilt 5"/>
           <p:cNvPicPr/>
           <p:nvPr/>
         </p:nvPicPr>
         <p:blipFill>
-          <a:blip r:embed="rId2"/>
+          <a:blip r:embed="rId3"/>
           <a:stretch/>
         </p:blipFill>
         <p:spPr>
@@ -2307,13 +2697,20 @@
           </a:ln>
         </p:spPr>
         <p:style>
-          <a:lnRef idx="0"/>
-          <a:fillRef idx="0"/>
-          <a:effectRef idx="0"/>
+          <a:lnRef idx="0">
+            <a:scrgbClr r="0" g="0" b="0"/>
+          </a:lnRef>
+          <a:fillRef idx="0">
+            <a:scrgbClr r="0" g="0" b="0"/>
+          </a:fillRef>
+          <a:effectRef idx="0">
+            <a:scrgbClr r="0" g="0" b="0"/>
+          </a:effectRef>
           <a:fontRef idx="minor"/>
         </p:style>
         <p:txBody>
-          <a:bodyPr lIns="90000" rIns="90000" tIns="45000" bIns="45000"/>
+          <a:bodyPr lIns="90000" tIns="45000" rIns="90000" bIns="45000"/>
+          <a:lstStyle/>
           <a:p>
             <a:pPr>
               <a:lnSpc>
@@ -2321,26 +2718,26 @@
               </a:lnSpc>
             </a:pPr>
             <a:r>
-              <a:rPr b="1" lang="en-GB" sz="6880" spc="-1" strike="noStrike">
-                <a:solidFill>
-                  <a:srgbClr val="ffffff"/>
+              <a:rPr lang="en-GB" sz="6880" b="1" strike="noStrike" spc="-1">
+                <a:solidFill>
+                  <a:srgbClr val="FFFFFF"/>
                 </a:solidFill>
                 <a:uFill>
                   <a:solidFill>
-                    <a:srgbClr val="ffffff"/>
+                    <a:srgbClr val="FFFFFF"/>
                   </a:solidFill>
                 </a:uFill>
                 <a:latin typeface="Times New Roman"/>
               </a:rPr>
               <a:t>INTRODUCTION</a:t>
             </a:r>
-            <a:endParaRPr b="0" lang="en-GB" sz="6869" spc="-1" strike="noStrike">
-              <a:solidFill>
-                <a:srgbClr val="000000"/>
-              </a:solidFill>
-              <a:uFill>
-                <a:solidFill>
-                  <a:srgbClr val="ffffff"/>
+            <a:endParaRPr lang="en-GB" sz="6869" b="0" strike="noStrike" spc="-1">
+              <a:solidFill>
+                <a:srgbClr val="000000"/>
+              </a:solidFill>
+              <a:uFill>
+                <a:solidFill>
+                  <a:srgbClr val="FFFFFF"/>
                 </a:solidFill>
               </a:uFill>
               <a:latin typeface="Arial"/>
@@ -2353,26 +2750,26 @@
               </a:lnSpc>
             </a:pPr>
             <a:r>
-              <a:rPr b="0" lang="en-GB" sz="5400" spc="-1" strike="noStrike">
-                <a:solidFill>
-                  <a:srgbClr val="ffffff"/>
+              <a:rPr lang="en-GB" sz="5400" b="0" strike="noStrike" spc="-1">
+                <a:solidFill>
+                  <a:srgbClr val="FFFFFF"/>
                 </a:solidFill>
                 <a:uFill>
                   <a:solidFill>
-                    <a:srgbClr val="ffffff"/>
+                    <a:srgbClr val="FFFFFF"/>
                   </a:solidFill>
                 </a:uFill>
                 <a:latin typeface="Times New Roman"/>
               </a:rPr>
               <a:t>Movies are interesting forms of media and the performance of each of them varies wildly. The aim of this project was to try and predict a movie’s box office and find the key features affecting the box office the most and analyzing the results. </a:t>
             </a:r>
-            <a:endParaRPr b="0" lang="en-GB" sz="6869" spc="-1" strike="noStrike">
-              <a:solidFill>
-                <a:srgbClr val="000000"/>
-              </a:solidFill>
-              <a:uFill>
-                <a:solidFill>
-                  <a:srgbClr val="ffffff"/>
+            <a:endParaRPr lang="en-GB" sz="6869" b="0" strike="noStrike" spc="-1">
+              <a:solidFill>
+                <a:srgbClr val="000000"/>
+              </a:solidFill>
+              <a:uFill>
+                <a:solidFill>
+                  <a:srgbClr val="FFFFFF"/>
                 </a:solidFill>
               </a:uFill>
               <a:latin typeface="Arial"/>
@@ -2400,13 +2797,20 @@
           </a:ln>
         </p:spPr>
         <p:style>
-          <a:lnRef idx="0"/>
-          <a:fillRef idx="0"/>
-          <a:effectRef idx="0"/>
+          <a:lnRef idx="0">
+            <a:scrgbClr r="0" g="0" b="0"/>
+          </a:lnRef>
+          <a:fillRef idx="0">
+            <a:scrgbClr r="0" g="0" b="0"/>
+          </a:fillRef>
+          <a:effectRef idx="0">
+            <a:scrgbClr r="0" g="0" b="0"/>
+          </a:effectRef>
           <a:fontRef idx="minor"/>
         </p:style>
         <p:txBody>
-          <a:bodyPr lIns="90000" rIns="90000" tIns="45000" bIns="45000"/>
+          <a:bodyPr lIns="90000" tIns="45000" rIns="90000" bIns="45000"/>
+          <a:lstStyle/>
           <a:p>
             <a:pPr>
               <a:lnSpc>
@@ -2414,26 +2818,26 @@
               </a:lnSpc>
             </a:pPr>
             <a:r>
-              <a:rPr b="1" lang="en-GB" sz="6880" spc="-1" strike="noStrike">
-                <a:solidFill>
-                  <a:srgbClr val="ffffff"/>
+              <a:rPr lang="en-GB" sz="6880" b="1" strike="noStrike" spc="-1">
+                <a:solidFill>
+                  <a:srgbClr val="FFFFFF"/>
                 </a:solidFill>
                 <a:uFill>
                   <a:solidFill>
-                    <a:srgbClr val="ffffff"/>
+                    <a:srgbClr val="FFFFFF"/>
                   </a:solidFill>
                 </a:uFill>
                 <a:latin typeface="Times New Roman"/>
               </a:rPr>
               <a:t>DATA</a:t>
             </a:r>
-            <a:endParaRPr b="0" lang="en-GB" sz="5400" spc="-1" strike="noStrike">
-              <a:solidFill>
-                <a:srgbClr val="000000"/>
-              </a:solidFill>
-              <a:uFill>
-                <a:solidFill>
-                  <a:srgbClr val="ffffff"/>
+            <a:endParaRPr lang="en-GB" sz="5400" b="0" strike="noStrike" spc="-1">
+              <a:solidFill>
+                <a:srgbClr val="000000"/>
+              </a:solidFill>
+              <a:uFill>
+                <a:solidFill>
+                  <a:srgbClr val="FFFFFF"/>
                 </a:solidFill>
               </a:uFill>
               <a:latin typeface="Arial"/>
@@ -2446,26 +2850,26 @@
               </a:lnSpc>
             </a:pPr>
             <a:r>
-              <a:rPr b="0" lang="en-GB" sz="5400" spc="-1" strike="noStrike">
-                <a:solidFill>
-                  <a:srgbClr val="ffffff"/>
+              <a:rPr lang="en-GB" sz="5400" b="0" strike="noStrike" spc="-1">
+                <a:solidFill>
+                  <a:srgbClr val="FFFFFF"/>
                 </a:solidFill>
                 <a:uFill>
                   <a:solidFill>
-                    <a:srgbClr val="ffffff"/>
+                    <a:srgbClr val="FFFFFF"/>
                   </a:solidFill>
                 </a:uFill>
                 <a:latin typeface="Times New Roman"/>
               </a:rPr>
               <a:t>We used data from Kaggle which had 6820 movies from 1986-2016 with each year having 220 movies. The data had been collected from IMDb. Some of the movies were missing the budget value so we filled in about 600 missing budgets by using the Wikipedia API. We ended up dropping the movies with no budget.</a:t>
             </a:r>
-            <a:endParaRPr b="0" lang="en-GB" sz="5400" spc="-1" strike="noStrike">
-              <a:solidFill>
-                <a:srgbClr val="000000"/>
-              </a:solidFill>
-              <a:uFill>
-                <a:solidFill>
-                  <a:srgbClr val="ffffff"/>
+            <a:endParaRPr lang="en-GB" sz="5400" b="0" strike="noStrike" spc="-1">
+              <a:solidFill>
+                <a:srgbClr val="000000"/>
+              </a:solidFill>
+              <a:uFill>
+                <a:solidFill>
+                  <a:srgbClr val="FFFFFF"/>
                 </a:solidFill>
               </a:uFill>
               <a:latin typeface="Arial"/>
@@ -2493,13 +2897,20 @@
           </a:ln>
         </p:spPr>
         <p:style>
-          <a:lnRef idx="0"/>
-          <a:fillRef idx="0"/>
-          <a:effectRef idx="0"/>
+          <a:lnRef idx="0">
+            <a:scrgbClr r="0" g="0" b="0"/>
+          </a:lnRef>
+          <a:fillRef idx="0">
+            <a:scrgbClr r="0" g="0" b="0"/>
+          </a:fillRef>
+          <a:effectRef idx="0">
+            <a:scrgbClr r="0" g="0" b="0"/>
+          </a:effectRef>
           <a:fontRef idx="minor"/>
         </p:style>
         <p:txBody>
-          <a:bodyPr lIns="90000" rIns="90000" tIns="45000" bIns="45000"/>
+          <a:bodyPr lIns="90000" tIns="45000" rIns="90000" bIns="45000"/>
+          <a:lstStyle/>
           <a:p>
             <a:pPr>
               <a:lnSpc>
@@ -2507,26 +2918,26 @@
               </a:lnSpc>
             </a:pPr>
             <a:r>
-              <a:rPr b="1" lang="en-GB" sz="6880" spc="-1" strike="noStrike">
-                <a:solidFill>
-                  <a:srgbClr val="ffffff"/>
+              <a:rPr lang="en-GB" sz="6880" b="1" strike="noStrike" spc="-1">
+                <a:solidFill>
+                  <a:srgbClr val="FFFFFF"/>
                 </a:solidFill>
                 <a:uFill>
                   <a:solidFill>
-                    <a:srgbClr val="ffffff"/>
+                    <a:srgbClr val="FFFFFF"/>
                   </a:solidFill>
                 </a:uFill>
                 <a:latin typeface="Times New Roman"/>
               </a:rPr>
               <a:t>PREDICTING AND DATA ANALYSIS</a:t>
             </a:r>
-            <a:endParaRPr b="0" lang="en-GB" sz="6869" spc="-1" strike="noStrike">
-              <a:solidFill>
-                <a:srgbClr val="000000"/>
-              </a:solidFill>
-              <a:uFill>
-                <a:solidFill>
-                  <a:srgbClr val="ffffff"/>
+            <a:endParaRPr lang="en-GB" sz="6869" b="0" strike="noStrike" spc="-1">
+              <a:solidFill>
+                <a:srgbClr val="000000"/>
+              </a:solidFill>
+              <a:uFill>
+                <a:solidFill>
+                  <a:srgbClr val="FFFFFF"/>
                 </a:solidFill>
               </a:uFill>
               <a:latin typeface="Arial"/>
@@ -2539,13 +2950,13 @@
               </a:lnSpc>
             </a:pPr>
             <a:r>
-              <a:rPr b="0" lang="en-GB" sz="5400" spc="-1" strike="noStrike">
-                <a:solidFill>
-                  <a:srgbClr val="ffffff"/>
+              <a:rPr lang="en-GB" sz="5400" b="0" strike="noStrike" spc="-1">
+                <a:solidFill>
+                  <a:srgbClr val="FFFFFF"/>
                 </a:solidFill>
                 <a:uFill>
                   <a:solidFill>
-                    <a:srgbClr val="ffffff"/>
+                    <a:srgbClr val="FFFFFF"/>
                   </a:solidFill>
                 </a:uFill>
                 <a:latin typeface="Times New Roman"/>
@@ -2553,26 +2964,26 @@
               <a:t>For predicting the box office we used the Random Forrest Classifier. We used the actual gross of the predicted movies to get the difference between each movie’s predicted and actual value. We also compared different features with each other to try and find correlations.</a:t>
             </a:r>
             <a:r>
-              <a:rPr b="0" lang="en-GB" sz="6880" spc="-1" strike="noStrike">
-                <a:solidFill>
-                  <a:srgbClr val="ffffff"/>
+              <a:rPr lang="en-GB" sz="6880" b="0" strike="noStrike" spc="-1">
+                <a:solidFill>
+                  <a:srgbClr val="FFFFFF"/>
                 </a:solidFill>
                 <a:uFill>
                   <a:solidFill>
-                    <a:srgbClr val="ffffff"/>
+                    <a:srgbClr val="FFFFFF"/>
                   </a:solidFill>
                 </a:uFill>
                 <a:latin typeface="Times New Roman"/>
               </a:rPr>
               <a:t>  </a:t>
             </a:r>
-            <a:endParaRPr b="0" lang="en-GB" sz="6869" spc="-1" strike="noStrike">
-              <a:solidFill>
-                <a:srgbClr val="000000"/>
-              </a:solidFill>
-              <a:uFill>
-                <a:solidFill>
-                  <a:srgbClr val="ffffff"/>
+            <a:endParaRPr lang="en-GB" sz="6869" b="0" strike="noStrike" spc="-1">
+              <a:solidFill>
+                <a:srgbClr val="000000"/>
+              </a:solidFill>
+              <a:uFill>
+                <a:solidFill>
+                  <a:srgbClr val="FFFFFF"/>
                 </a:solidFill>
               </a:uFill>
               <a:latin typeface="Arial"/>
@@ -2600,13 +3011,20 @@
           </a:ln>
         </p:spPr>
         <p:style>
-          <a:lnRef idx="0"/>
-          <a:fillRef idx="0"/>
-          <a:effectRef idx="0"/>
+          <a:lnRef idx="0">
+            <a:scrgbClr r="0" g="0" b="0"/>
+          </a:lnRef>
+          <a:fillRef idx="0">
+            <a:scrgbClr r="0" g="0" b="0"/>
+          </a:fillRef>
+          <a:effectRef idx="0">
+            <a:scrgbClr r="0" g="0" b="0"/>
+          </a:effectRef>
           <a:fontRef idx="minor"/>
         </p:style>
         <p:txBody>
-          <a:bodyPr lIns="90000" rIns="90000" tIns="45000" bIns="45000"/>
+          <a:bodyPr lIns="90000" tIns="45000" rIns="90000" bIns="45000"/>
+          <a:lstStyle/>
           <a:p>
             <a:pPr algn="just">
               <a:lnSpc>
@@ -2614,26 +3032,26 @@
               </a:lnSpc>
             </a:pPr>
             <a:r>
-              <a:rPr b="1" lang="en-GB" sz="6880" spc="-1" strike="noStrike">
-                <a:solidFill>
-                  <a:srgbClr val="ffffff"/>
+              <a:rPr lang="en-GB" sz="6880" b="1" strike="noStrike" spc="-1">
+                <a:solidFill>
+                  <a:srgbClr val="FFFFFF"/>
                 </a:solidFill>
                 <a:uFill>
                   <a:solidFill>
-                    <a:srgbClr val="ffffff"/>
+                    <a:srgbClr val="FFFFFF"/>
                   </a:solidFill>
                 </a:uFill>
                 <a:latin typeface="Times New Roman"/>
               </a:rPr>
               <a:t>RESULTS</a:t>
             </a:r>
-            <a:endParaRPr b="0" lang="en-GB" sz="6869" spc="-1" strike="noStrike">
-              <a:solidFill>
-                <a:srgbClr val="000000"/>
-              </a:solidFill>
-              <a:uFill>
-                <a:solidFill>
-                  <a:srgbClr val="ffffff"/>
+            <a:endParaRPr lang="en-GB" sz="6869" b="0" strike="noStrike" spc="-1">
+              <a:solidFill>
+                <a:srgbClr val="000000"/>
+              </a:solidFill>
+              <a:uFill>
+                <a:solidFill>
+                  <a:srgbClr val="FFFFFF"/>
                 </a:solidFill>
               </a:uFill>
               <a:latin typeface="Arial"/>
@@ -2646,26 +3064,26 @@
               </a:lnSpc>
             </a:pPr>
             <a:r>
-              <a:rPr b="0" lang="en-GB" sz="5400" spc="-1" strike="noStrike">
-                <a:solidFill>
-                  <a:srgbClr val="ffffff"/>
+              <a:rPr lang="en-GB" sz="5400" b="0" strike="noStrike" spc="-1">
+                <a:solidFill>
+                  <a:srgbClr val="FFFFFF"/>
                 </a:solidFill>
                 <a:uFill>
                   <a:solidFill>
-                    <a:srgbClr val="ffffff"/>
+                    <a:srgbClr val="FFFFFF"/>
                   </a:solidFill>
                 </a:uFill>
                 <a:latin typeface="Times New Roman"/>
               </a:rPr>
               <a:t>We found that the key features of movie’s box office are budget and the number of votes. We also found that the bigger the movie’s gross is, the bigger the error between real and predicted gross was. Overall, the prediction didn’t seem to produce any reliable results. In hindsight this seems quite obvious, considering the nature of movies and the complexity of their production. </a:t>
             </a:r>
-            <a:endParaRPr b="0" lang="en-GB" sz="6869" spc="-1" strike="noStrike">
-              <a:solidFill>
-                <a:srgbClr val="000000"/>
-              </a:solidFill>
-              <a:uFill>
-                <a:solidFill>
-                  <a:srgbClr val="ffffff"/>
+            <a:endParaRPr lang="en-GB" sz="6869" b="0" strike="noStrike" spc="-1">
+              <a:solidFill>
+                <a:srgbClr val="000000"/>
+              </a:solidFill>
+              <a:uFill>
+                <a:solidFill>
+                  <a:srgbClr val="FFFFFF"/>
                 </a:solidFill>
               </a:uFill>
               <a:latin typeface="Arial"/>
@@ -2675,80 +3093,7 @@
       </p:sp>
       <p:pic>
         <p:nvPicPr>
-          <p:cNvPr id="49" name="Pilt 11" descr=""/>
-          <p:cNvPicPr/>
-          <p:nvPr/>
-        </p:nvPicPr>
-        <p:blipFill>
-          <a:blip r:embed="rId3"/>
-          <a:stretch/>
-        </p:blipFill>
-        <p:spPr>
-          <a:xfrm>
-            <a:off x="1991520" y="19877760"/>
-            <a:ext cx="10232280" cy="6821280"/>
-          </a:xfrm>
-          <a:prstGeom prst="rect">
-            <a:avLst/>
-          </a:prstGeom>
-          <a:ln>
-            <a:noFill/>
-          </a:ln>
-        </p:spPr>
-      </p:pic>
-      <p:sp>
-        <p:nvSpPr>
-          <p:cNvPr id="50" name="TextShape 7"/>
-          <p:cNvSpPr txBox="1"/>
-          <p:nvPr/>
-        </p:nvSpPr>
-        <p:spPr>
-          <a:xfrm>
-            <a:off x="10945080" y="21952080"/>
-            <a:ext cx="3134160" cy="599400"/>
-          </a:xfrm>
-          <a:prstGeom prst="rect">
-            <a:avLst/>
-          </a:prstGeom>
-          <a:noFill/>
-          <a:ln>
-            <a:noFill/>
-          </a:ln>
-        </p:spPr>
-        <p:txBody>
-          <a:bodyPr lIns="90000" rIns="90000" tIns="45000" bIns="45000"/>
-          <a:p>
-            <a:r>
-              <a:rPr b="0" lang="en-GB" sz="1800" spc="-1" strike="noStrike">
-                <a:solidFill>
-                  <a:srgbClr val="000000"/>
-                </a:solidFill>
-                <a:uFill>
-                  <a:solidFill>
-                    <a:srgbClr val="ffffff"/>
-                  </a:solidFill>
-                </a:uFill>
-                <a:latin typeface="Arial"/>
-              </a:rPr>
-              <a:t>plt.savefig('yourfilename.pdf')</a:t>
-            </a:r>
-            <a:endParaRPr b="0" lang="en-GB" sz="1800" spc="-1" strike="noStrike">
-              <a:solidFill>
-                <a:srgbClr val="000000"/>
-              </a:solidFill>
-              <a:uFill>
-                <a:solidFill>
-                  <a:srgbClr val="ffffff"/>
-                </a:solidFill>
-              </a:uFill>
-              <a:latin typeface="Arial"/>
-            </a:endParaRPr>
-          </a:p>
-        </p:txBody>
-      </p:sp>
-      <p:pic>
-        <p:nvPicPr>
-          <p:cNvPr id="51" name="" descr=""/>
+          <p:cNvPr id="49" name="Pilt 11"/>
           <p:cNvPicPr/>
           <p:nvPr/>
         </p:nvPicPr>
@@ -2758,8 +3103,8 @@
         </p:blipFill>
         <p:spPr>
           <a:xfrm>
-            <a:off x="15912000" y="18430560"/>
-            <a:ext cx="12270600" cy="10225440"/>
+            <a:off x="15906240" y="19825560"/>
+            <a:ext cx="12098160" cy="8273160"/>
           </a:xfrm>
           <a:prstGeom prst="rect">
             <a:avLst/>
@@ -2769,8 +3114,74 @@
           </a:ln>
         </p:spPr>
       </p:pic>
+      <p:sp>
+        <p:nvSpPr>
+          <p:cNvPr id="50" name="TextShape 7"/>
+          <p:cNvSpPr txBox="1"/>
+          <p:nvPr/>
+        </p:nvSpPr>
+        <p:spPr>
+          <a:xfrm>
+            <a:off x="10945080" y="21952080"/>
+            <a:ext cx="3134160" cy="599400"/>
+          </a:xfrm>
+          <a:prstGeom prst="rect">
+            <a:avLst/>
+          </a:prstGeom>
+          <a:noFill/>
+          <a:ln>
+            <a:noFill/>
+          </a:ln>
+        </p:spPr>
+        <p:txBody>
+          <a:bodyPr lIns="90000" tIns="45000" rIns="90000" bIns="45000"/>
+          <a:lstStyle/>
+          <a:p>
+            <a:r>
+              <a:rPr lang="en-GB" sz="1800" b="0" strike="noStrike" spc="-1">
+                <a:solidFill>
+                  <a:srgbClr val="000000"/>
+                </a:solidFill>
+                <a:uFill>
+                  <a:solidFill>
+                    <a:srgbClr val="FFFFFF"/>
+                  </a:solidFill>
+                </a:uFill>
+                <a:latin typeface="Arial"/>
+              </a:rPr>
+              <a:t>plt.savefig('yourfilename.pdf')</a:t>
+            </a:r>
+          </a:p>
+        </p:txBody>
+      </p:sp>
+      <p:pic>
+        <p:nvPicPr>
+          <p:cNvPr id="51" name="Pilt 50"/>
+          <p:cNvPicPr/>
+          <p:nvPr/>
+        </p:nvPicPr>
+        <p:blipFill>
+          <a:blip r:embed="rId5"/>
+          <a:stretch/>
+        </p:blipFill>
+        <p:spPr>
+          <a:xfrm>
+            <a:off x="1365480" y="17873280"/>
+            <a:ext cx="12270600" cy="10225440"/>
+          </a:xfrm>
+          <a:prstGeom prst="rect">
+            <a:avLst/>
+          </a:prstGeom>
+          <a:ln>
+            <a:noFill/>
+          </a:ln>
+        </p:spPr>
+      </p:pic>
     </p:spTree>
   </p:cSld>
+  <p:clrMapOvr>
+    <a:masterClrMapping/>
+  </p:clrMapOvr>
   <p:timing>
     <p:tnLst>
       <p:par>
@@ -2779,14 +3190,14 @@
             <p:seq>
               <p:cTn id="2" nodeType="mainSeq"/>
               <p:prevCondLst>
-                <p:cond delay="0" evt="onPrev">
+                <p:cond evt="onPrev" delay="0">
                   <p:tgtEl>
                     <p:sldTgt/>
                   </p:tgtEl>
                 </p:cond>
               </p:prevCondLst>
               <p:nextCondLst>
-                <p:cond delay="0" evt="onNext">
+                <p:cond evt="onNext" delay="0">
                   <p:tgtEl>
                     <p:sldTgt/>
                   </p:tgtEl>
@@ -3021,5 +3432,7 @@
       </a:bgFillStyleLst>
     </a:fmtScheme>
   </a:themeElements>
+  <a:objectDefaults/>
+  <a:extraClrSchemeLst/>
 </a:theme>
 </file>
</xml_diff>